<commit_message>
Extrapolation during ~2 more seconds
</commit_message>
<xml_diff>
--- a/assets/Projet_double_pendulum.pptx
+++ b/assets/Projet_double_pendulum.pptx
@@ -5,23 +5,21 @@
     <p:sldMasterId id="2147483763" r:id="rId4"/>
   </p:sldMasterIdLst>
   <p:notesMasterIdLst>
-    <p:notesMasterId r:id="rId13"/>
+    <p:notesMasterId r:id="rId11"/>
   </p:notesMasterIdLst>
   <p:handoutMasterIdLst>
-    <p:handoutMasterId r:id="rId14"/>
+    <p:handoutMasterId r:id="rId12"/>
   </p:handoutMasterIdLst>
   <p:sldIdLst>
     <p:sldId id="773" r:id="rId5"/>
-    <p:sldId id="811" r:id="rId6"/>
-    <p:sldId id="813" r:id="rId7"/>
-    <p:sldId id="814" r:id="rId8"/>
-    <p:sldId id="815" r:id="rId9"/>
-    <p:sldId id="816" r:id="rId10"/>
-    <p:sldId id="817" r:id="rId11"/>
-    <p:sldId id="812" r:id="rId12"/>
+    <p:sldId id="813" r:id="rId6"/>
+    <p:sldId id="815" r:id="rId7"/>
+    <p:sldId id="818" r:id="rId8"/>
+    <p:sldId id="817" r:id="rId9"/>
+    <p:sldId id="812" r:id="rId10"/>
   </p:sldIdLst>
   <p:sldSz cx="12192000" cy="6858000"/>
-  <p:notesSz cx="7099300" cy="10234613"/>
+  <p:notesSz cx="7104063" cy="10234613"/>
   <p:defaultTextStyle>
     <a:defPPr>
       <a:defRPr lang="fr-FR"/>
@@ -123,11 +121,9 @@
         <p14:section name="Présentations" id="{7C826870-920B-4148-9F65-EC0CA3E72225}">
           <p14:sldIdLst>
             <p14:sldId id="773"/>
-            <p14:sldId id="811"/>
             <p14:sldId id="813"/>
-            <p14:sldId id="814"/>
             <p14:sldId id="815"/>
-            <p14:sldId id="816"/>
+            <p14:sldId id="818"/>
             <p14:sldId id="817"/>
             <p14:sldId id="812"/>
           </p14:sldIdLst>
@@ -155,7 +151,7 @@
             <a:srgbClr val="A4A3A4"/>
           </p15:clr>
         </p15:guide>
-        <p15:guide id="2" pos="2237" userDrawn="1">
+        <p15:guide id="2" pos="2239" userDrawn="1">
           <p15:clr>
             <a:srgbClr val="A4A3A4"/>
           </p15:clr>
@@ -295,8 +291,8 @@
         </p:nvSpPr>
         <p:spPr>
           <a:xfrm>
-            <a:off x="2" y="0"/>
-            <a:ext cx="3076363" cy="511731"/>
+            <a:off x="2" y="1"/>
+            <a:ext cx="3078427" cy="511731"/>
           </a:xfrm>
           <a:prstGeom prst="rect">
             <a:avLst/>
@@ -326,8 +322,8 @@
         </p:nvSpPr>
         <p:spPr>
           <a:xfrm>
-            <a:off x="4021296" y="0"/>
-            <a:ext cx="3076363" cy="511731"/>
+            <a:off x="4023994" y="1"/>
+            <a:ext cx="3078427" cy="511731"/>
           </a:xfrm>
           <a:prstGeom prst="rect">
             <a:avLst/>
@@ -362,8 +358,8 @@
         </p:nvSpPr>
         <p:spPr>
           <a:xfrm>
-            <a:off x="2" y="9721107"/>
-            <a:ext cx="3076363" cy="511731"/>
+            <a:off x="2" y="9721108"/>
+            <a:ext cx="3078427" cy="511731"/>
           </a:xfrm>
           <a:prstGeom prst="rect">
             <a:avLst/>
@@ -393,8 +389,8 @@
         </p:nvSpPr>
         <p:spPr>
           <a:xfrm>
-            <a:off x="4021296" y="9721107"/>
-            <a:ext cx="3076363" cy="511731"/>
+            <a:off x="4023994" y="9721108"/>
+            <a:ext cx="3078427" cy="511731"/>
           </a:xfrm>
           <a:prstGeom prst="rect">
             <a:avLst/>
@@ -462,8 +458,8 @@
         </p:nvSpPr>
         <p:spPr>
           <a:xfrm>
-            <a:off x="2" y="0"/>
-            <a:ext cx="3076363" cy="511731"/>
+            <a:off x="2" y="1"/>
+            <a:ext cx="3078427" cy="511731"/>
           </a:xfrm>
           <a:prstGeom prst="rect">
             <a:avLst/>
@@ -493,8 +489,8 @@
         </p:nvSpPr>
         <p:spPr>
           <a:xfrm>
-            <a:off x="4021296" y="0"/>
-            <a:ext cx="3076363" cy="511731"/>
+            <a:off x="4023994" y="1"/>
+            <a:ext cx="3078427" cy="511731"/>
           </a:xfrm>
           <a:prstGeom prst="rect">
             <a:avLst/>
@@ -529,8 +525,8 @@
         </p:nvSpPr>
         <p:spPr>
           <a:xfrm>
-            <a:off x="138113" y="766763"/>
-            <a:ext cx="6823075" cy="3838575"/>
+            <a:off x="139700" y="766763"/>
+            <a:ext cx="6824663" cy="3838575"/>
           </a:xfrm>
           <a:prstGeom prst="rect">
             <a:avLst/>
@@ -562,8 +558,8 @@
         </p:nvSpPr>
         <p:spPr>
           <a:xfrm>
-            <a:off x="709931" y="4861441"/>
-            <a:ext cx="5679440" cy="4605577"/>
+            <a:off x="710408" y="4861442"/>
+            <a:ext cx="5683250" cy="4605577"/>
           </a:xfrm>
           <a:prstGeom prst="rect">
             <a:avLst/>
@@ -624,8 +620,8 @@
         </p:nvSpPr>
         <p:spPr>
           <a:xfrm>
-            <a:off x="2" y="9721107"/>
-            <a:ext cx="3076363" cy="511731"/>
+            <a:off x="2" y="9721108"/>
+            <a:ext cx="3078427" cy="511731"/>
           </a:xfrm>
           <a:prstGeom prst="rect">
             <a:avLst/>
@@ -655,8 +651,8 @@
         </p:nvSpPr>
         <p:spPr>
           <a:xfrm>
-            <a:off x="4021296" y="9721107"/>
-            <a:ext cx="3076363" cy="511731"/>
+            <a:off x="4023994" y="9721108"/>
+            <a:ext cx="3078427" cy="511731"/>
           </a:xfrm>
           <a:prstGeom prst="rect">
             <a:avLst/>
@@ -811,8 +807,8 @@
         </p:nvSpPr>
         <p:spPr>
           <a:xfrm>
-            <a:off x="457200" y="719138"/>
-            <a:ext cx="6400800" cy="3602037"/>
+            <a:off x="458788" y="719138"/>
+            <a:ext cx="6402387" cy="3602037"/>
           </a:xfrm>
         </p:spPr>
       </p:sp>
@@ -877,120 +873,6 @@
 </file>
 
 <file path=ppt/notesSlides/notesSlide2.xml><?xml version="1.0" encoding="utf-8"?>
-<p:notes xmlns:a="http://schemas.openxmlformats.org/drawingml/2006/main" xmlns:r="http://schemas.openxmlformats.org/officeDocument/2006/relationships" xmlns:p="http://schemas.openxmlformats.org/presentationml/2006/main">
-  <p:cSld>
-    <p:spTree>
-      <p:nvGrpSpPr>
-        <p:cNvPr id="1" name="">
-          <a:extLst>
-            <a:ext uri="{FF2B5EF4-FFF2-40B4-BE49-F238E27FC236}">
-              <a16:creationId xmlns:a16="http://schemas.microsoft.com/office/drawing/2014/main" id="{01CE70B3-5C3A-E372-BFC0-C3901FECCCDD}"/>
-            </a:ext>
-          </a:extLst>
-        </p:cNvPr>
-        <p:cNvGrpSpPr/>
-        <p:nvPr/>
-      </p:nvGrpSpPr>
-      <p:grpSpPr>
-        <a:xfrm>
-          <a:off x="0" y="0"/>
-          <a:ext cx="0" cy="0"/>
-          <a:chOff x="0" y="0"/>
-          <a:chExt cx="0" cy="0"/>
-        </a:xfrm>
-      </p:grpSpPr>
-      <p:sp>
-        <p:nvSpPr>
-          <p:cNvPr id="2" name="Espace réservé de l'image des diapositives 1">
-            <a:extLst>
-              <a:ext uri="{FF2B5EF4-FFF2-40B4-BE49-F238E27FC236}">
-                <a16:creationId xmlns:a16="http://schemas.microsoft.com/office/drawing/2014/main" id="{4B3A9B30-9C0D-D3C1-3C88-BCCD6EB8D297}"/>
-              </a:ext>
-            </a:extLst>
-          </p:cNvPr>
-          <p:cNvSpPr>
-            <a:spLocks noGrp="1" noRot="1" noChangeAspect="1"/>
-          </p:cNvSpPr>
-          <p:nvPr>
-            <p:ph type="sldImg"/>
-          </p:nvPr>
-        </p:nvSpPr>
-        <p:spPr>
-          <a:xfrm>
-            <a:off x="138113" y="766763"/>
-            <a:ext cx="6823075" cy="3838575"/>
-          </a:xfrm>
-        </p:spPr>
-      </p:sp>
-      <p:sp>
-        <p:nvSpPr>
-          <p:cNvPr id="3" name="Espace réservé des notes 2">
-            <a:extLst>
-              <a:ext uri="{FF2B5EF4-FFF2-40B4-BE49-F238E27FC236}">
-                <a16:creationId xmlns:a16="http://schemas.microsoft.com/office/drawing/2014/main" id="{012C252D-E5B4-8901-8A42-D7C966A19CDB}"/>
-              </a:ext>
-            </a:extLst>
-          </p:cNvPr>
-          <p:cNvSpPr>
-            <a:spLocks noGrp="1"/>
-          </p:cNvSpPr>
-          <p:nvPr>
-            <p:ph type="body" idx="1"/>
-          </p:nvPr>
-        </p:nvSpPr>
-        <p:spPr/>
-        <p:txBody>
-          <a:bodyPr/>
-          <a:lstStyle/>
-          <a:p>
-            <a:endParaRPr lang="fr-CH" dirty="0"/>
-          </a:p>
-        </p:txBody>
-      </p:sp>
-      <p:sp>
-        <p:nvSpPr>
-          <p:cNvPr id="4" name="Espace réservé du numéro de diapositive 3">
-            <a:extLst>
-              <a:ext uri="{FF2B5EF4-FFF2-40B4-BE49-F238E27FC236}">
-                <a16:creationId xmlns:a16="http://schemas.microsoft.com/office/drawing/2014/main" id="{E41AE91E-75A0-FD79-3004-CEA94469AB2A}"/>
-              </a:ext>
-            </a:extLst>
-          </p:cNvPr>
-          <p:cNvSpPr>
-            <a:spLocks noGrp="1"/>
-          </p:cNvSpPr>
-          <p:nvPr>
-            <p:ph type="sldNum" sz="quarter" idx="5"/>
-          </p:nvPr>
-        </p:nvSpPr>
-        <p:spPr/>
-        <p:txBody>
-          <a:bodyPr/>
-          <a:lstStyle/>
-          <a:p>
-            <a:fld id="{9E3519E5-025F-4B1C-8C8E-E5E4EA4A6412}" type="slidenum">
-              <a:rPr lang="fr-CH" smtClean="0"/>
-              <a:pPr/>
-              <a:t>2</a:t>
-            </a:fld>
-            <a:endParaRPr lang="fr-CH"/>
-          </a:p>
-        </p:txBody>
-      </p:sp>
-    </p:spTree>
-    <p:extLst>
-      <p:ext uri="{BB962C8B-B14F-4D97-AF65-F5344CB8AC3E}">
-        <p14:creationId xmlns:p14="http://schemas.microsoft.com/office/powerpoint/2010/main" val="3396317141"/>
-      </p:ext>
-    </p:extLst>
-  </p:cSld>
-  <p:clrMapOvr>
-    <a:masterClrMapping/>
-  </p:clrMapOvr>
-</p:notes>
-</file>
-
-<file path=ppt/notesSlides/notesSlide3.xml><?xml version="1.0" encoding="utf-8"?>
 <p:notes xmlns:a="http://schemas.openxmlformats.org/drawingml/2006/main" xmlns:r="http://schemas.openxmlformats.org/officeDocument/2006/relationships" xmlns:p="http://schemas.openxmlformats.org/presentationml/2006/main">
   <p:cSld>
     <p:spTree>
@@ -1031,8 +913,8 @@
         </p:nvSpPr>
         <p:spPr>
           <a:xfrm>
-            <a:off x="138113" y="766763"/>
-            <a:ext cx="6823075" cy="3838575"/>
+            <a:off x="139700" y="766763"/>
+            <a:ext cx="6824663" cy="3838575"/>
           </a:xfrm>
         </p:spPr>
       </p:sp>
@@ -1085,7 +967,7 @@
             <a:fld id="{9E3519E5-025F-4B1C-8C8E-E5E4EA4A6412}" type="slidenum">
               <a:rPr lang="fr-CH" smtClean="0"/>
               <a:pPr/>
-              <a:t>3</a:t>
+              <a:t>2</a:t>
             </a:fld>
             <a:endParaRPr lang="fr-CH"/>
           </a:p>
@@ -1104,121 +986,7 @@
 </p:notes>
 </file>
 
-<file path=ppt/notesSlides/notesSlide4.xml><?xml version="1.0" encoding="utf-8"?>
-<p:notes xmlns:a="http://schemas.openxmlformats.org/drawingml/2006/main" xmlns:r="http://schemas.openxmlformats.org/officeDocument/2006/relationships" xmlns:p="http://schemas.openxmlformats.org/presentationml/2006/main">
-  <p:cSld>
-    <p:spTree>
-      <p:nvGrpSpPr>
-        <p:cNvPr id="1" name="">
-          <a:extLst>
-            <a:ext uri="{FF2B5EF4-FFF2-40B4-BE49-F238E27FC236}">
-              <a16:creationId xmlns:a16="http://schemas.microsoft.com/office/drawing/2014/main" id="{BA9DE619-40A5-3C78-63D6-245FA1A9295C}"/>
-            </a:ext>
-          </a:extLst>
-        </p:cNvPr>
-        <p:cNvGrpSpPr/>
-        <p:nvPr/>
-      </p:nvGrpSpPr>
-      <p:grpSpPr>
-        <a:xfrm>
-          <a:off x="0" y="0"/>
-          <a:ext cx="0" cy="0"/>
-          <a:chOff x="0" y="0"/>
-          <a:chExt cx="0" cy="0"/>
-        </a:xfrm>
-      </p:grpSpPr>
-      <p:sp>
-        <p:nvSpPr>
-          <p:cNvPr id="2" name="Espace réservé de l'image des diapositives 1">
-            <a:extLst>
-              <a:ext uri="{FF2B5EF4-FFF2-40B4-BE49-F238E27FC236}">
-                <a16:creationId xmlns:a16="http://schemas.microsoft.com/office/drawing/2014/main" id="{9C828684-46B9-542D-7D78-91D15EC9E72E}"/>
-              </a:ext>
-            </a:extLst>
-          </p:cNvPr>
-          <p:cNvSpPr>
-            <a:spLocks noGrp="1" noRot="1" noChangeAspect="1"/>
-          </p:cNvSpPr>
-          <p:nvPr>
-            <p:ph type="sldImg"/>
-          </p:nvPr>
-        </p:nvSpPr>
-        <p:spPr>
-          <a:xfrm>
-            <a:off x="138113" y="766763"/>
-            <a:ext cx="6823075" cy="3838575"/>
-          </a:xfrm>
-        </p:spPr>
-      </p:sp>
-      <p:sp>
-        <p:nvSpPr>
-          <p:cNvPr id="3" name="Espace réservé des notes 2">
-            <a:extLst>
-              <a:ext uri="{FF2B5EF4-FFF2-40B4-BE49-F238E27FC236}">
-                <a16:creationId xmlns:a16="http://schemas.microsoft.com/office/drawing/2014/main" id="{9DA95E76-D1BF-EFA3-9D28-29971EA0364F}"/>
-              </a:ext>
-            </a:extLst>
-          </p:cNvPr>
-          <p:cNvSpPr>
-            <a:spLocks noGrp="1"/>
-          </p:cNvSpPr>
-          <p:nvPr>
-            <p:ph type="body" idx="1"/>
-          </p:nvPr>
-        </p:nvSpPr>
-        <p:spPr/>
-        <p:txBody>
-          <a:bodyPr/>
-          <a:lstStyle/>
-          <a:p>
-            <a:endParaRPr lang="fr-CH" dirty="0"/>
-          </a:p>
-        </p:txBody>
-      </p:sp>
-      <p:sp>
-        <p:nvSpPr>
-          <p:cNvPr id="4" name="Espace réservé du numéro de diapositive 3">
-            <a:extLst>
-              <a:ext uri="{FF2B5EF4-FFF2-40B4-BE49-F238E27FC236}">
-                <a16:creationId xmlns:a16="http://schemas.microsoft.com/office/drawing/2014/main" id="{D3680C32-6122-CD19-8CDA-E8FE36008364}"/>
-              </a:ext>
-            </a:extLst>
-          </p:cNvPr>
-          <p:cNvSpPr>
-            <a:spLocks noGrp="1"/>
-          </p:cNvSpPr>
-          <p:nvPr>
-            <p:ph type="sldNum" sz="quarter" idx="5"/>
-          </p:nvPr>
-        </p:nvSpPr>
-        <p:spPr/>
-        <p:txBody>
-          <a:bodyPr/>
-          <a:lstStyle/>
-          <a:p>
-            <a:fld id="{9E3519E5-025F-4B1C-8C8E-E5E4EA4A6412}" type="slidenum">
-              <a:rPr lang="fr-CH" smtClean="0"/>
-              <a:pPr/>
-              <a:t>4</a:t>
-            </a:fld>
-            <a:endParaRPr lang="fr-CH"/>
-          </a:p>
-        </p:txBody>
-      </p:sp>
-    </p:spTree>
-    <p:extLst>
-      <p:ext uri="{BB962C8B-B14F-4D97-AF65-F5344CB8AC3E}">
-        <p14:creationId xmlns:p14="http://schemas.microsoft.com/office/powerpoint/2010/main" val="3729289138"/>
-      </p:ext>
-    </p:extLst>
-  </p:cSld>
-  <p:clrMapOvr>
-    <a:masterClrMapping/>
-  </p:clrMapOvr>
-</p:notes>
-</file>
-
-<file path=ppt/notesSlides/notesSlide5.xml><?xml version="1.0" encoding="utf-8"?>
+<file path=ppt/notesSlides/notesSlide3.xml><?xml version="1.0" encoding="utf-8"?>
 <p:notes xmlns:a="http://schemas.openxmlformats.org/drawingml/2006/main" xmlns:r="http://schemas.openxmlformats.org/officeDocument/2006/relationships" xmlns:p="http://schemas.openxmlformats.org/presentationml/2006/main">
   <p:cSld>
     <p:spTree>
@@ -1259,36 +1027,221 @@
         </p:nvSpPr>
         <p:spPr>
           <a:xfrm>
-            <a:off x="138113" y="766763"/>
-            <a:ext cx="6823075" cy="3838575"/>
+            <a:off x="139700" y="766763"/>
+            <a:ext cx="6824663" cy="3838575"/>
           </a:xfrm>
         </p:spPr>
       </p:sp>
-      <p:sp>
-        <p:nvSpPr>
-          <p:cNvPr id="3" name="Espace réservé des notes 2">
-            <a:extLst>
-              <a:ext uri="{FF2B5EF4-FFF2-40B4-BE49-F238E27FC236}">
-                <a16:creationId xmlns:a16="http://schemas.microsoft.com/office/drawing/2014/main" id="{8B662EDB-FE17-2C96-678B-4B2A953B2D3A}"/>
-              </a:ext>
-            </a:extLst>
-          </p:cNvPr>
-          <p:cNvSpPr>
-            <a:spLocks noGrp="1"/>
-          </p:cNvSpPr>
-          <p:nvPr>
-            <p:ph type="body" idx="1"/>
-          </p:nvPr>
-        </p:nvSpPr>
-        <p:spPr/>
-        <p:txBody>
-          <a:bodyPr/>
-          <a:lstStyle/>
-          <a:p>
-            <a:endParaRPr lang="fr-CH" dirty="0"/>
-          </a:p>
-        </p:txBody>
-      </p:sp>
+      <mc:AlternateContent xmlns:mc="http://schemas.openxmlformats.org/markup-compatibility/2006">
+        <mc:Choice xmlns:a14="http://schemas.microsoft.com/office/drawing/2010/main" Requires="a14">
+          <p:sp>
+            <p:nvSpPr>
+              <p:cNvPr id="3" name="Espace réservé des notes 2">
+                <a:extLst>
+                  <a:ext uri="{FF2B5EF4-FFF2-40B4-BE49-F238E27FC236}">
+                    <a16:creationId xmlns:a16="http://schemas.microsoft.com/office/drawing/2014/main" id="{8B662EDB-FE17-2C96-678B-4B2A953B2D3A}"/>
+                  </a:ext>
+                </a:extLst>
+              </p:cNvPr>
+              <p:cNvSpPr>
+                <a:spLocks noGrp="1"/>
+              </p:cNvSpPr>
+              <p:nvPr>
+                <p:ph type="body" idx="1"/>
+              </p:nvPr>
+            </p:nvSpPr>
+            <p:spPr/>
+            <p:txBody>
+              <a:bodyPr/>
+              <a:lstStyle/>
+              <a:p>
+                <a:r>
+                  <a:rPr lang="fr-FR" dirty="0"/>
+                  <a:t>Pour la mise en équation, je me suis appuyée sur le formalisme lagrangien, car il est adapté aux systèmes mécaniques complexes comme le double pendule.</a:t>
+                </a:r>
+              </a:p>
+              <a:p>
+                <a:endParaRPr lang="fr-FR" dirty="0"/>
+              </a:p>
+              <a:p>
+                <a:r>
+                  <a:rPr lang="fr-FR" dirty="0"/>
+                  <a:t>Le </a:t>
+                </a:r>
+                <a:r>
+                  <a:rPr lang="fr-FR" b="1" dirty="0"/>
+                  <a:t>Lagrangien</a:t>
+                </a:r>
+                <a:r>
+                  <a:rPr lang="fr-FR" dirty="0"/>
+                  <a:t> est une fonction qui décrit un système mécanique à partir de son énergie cinétique </a:t>
+                </a:r>
+                <a14:m>
+                  <m:oMath xmlns:m="http://schemas.openxmlformats.org/officeDocument/2006/math">
+                    <m:r>
+                      <a:rPr lang="fr-FR" sz="1200" i="1" kern="1200">
+                        <a:solidFill>
+                          <a:schemeClr val="tx1"/>
+                        </a:solidFill>
+                        <a:latin typeface="+mn-lt"/>
+                        <a:ea typeface="+mn-ea"/>
+                        <a:cs typeface="+mn-cs"/>
+                      </a:rPr>
+                      <m:t>𝑇</m:t>
+                    </m:r>
+                  </m:oMath>
+                </a14:m>
+                <a:r>
+                  <a:rPr lang="fr-FR" dirty="0"/>
+                  <a:t> et de son énergie potentielle </a:t>
+                </a:r>
+                <a14:m>
+                  <m:oMath xmlns:m="http://schemas.openxmlformats.org/officeDocument/2006/math">
+                    <m:r>
+                      <a:rPr lang="fr-FR" sz="1200" i="1" kern="1200">
+                        <a:solidFill>
+                          <a:schemeClr val="tx1"/>
+                        </a:solidFill>
+                        <a:latin typeface="+mn-lt"/>
+                        <a:ea typeface="+mn-ea"/>
+                        <a:cs typeface="+mn-cs"/>
+                      </a:rPr>
+                      <m:t>𝑉</m:t>
+                    </m:r>
+                  </m:oMath>
+                </a14:m>
+                <a:r>
+                  <a:rPr lang="fr-FR" dirty="0"/>
+                  <a:t>.</a:t>
+                </a:r>
+                <a:br>
+                  <a:rPr lang="fr-FR" dirty="0"/>
+                </a:br>
+                <a:r>
+                  <a:rPr lang="fr-FR" dirty="0"/>
+                  <a:t>Il sert de point de départ aux équations d’Euler–Lagrange pour obtenir les équations du mouvement.</a:t>
+                </a:r>
+                <a:endParaRPr lang="fr-CH" dirty="0"/>
+              </a:p>
+              <a:p>
+                <a:endParaRPr lang="fr-CH" dirty="0"/>
+              </a:p>
+              <a:p>
+                <a:r>
+                  <a:rPr lang="fr-CH" dirty="0"/>
+                  <a:t>T = énergie cinétique = dépend vitesse angulaires</a:t>
+                </a:r>
+              </a:p>
+              <a:p>
+                <a:r>
+                  <a:rPr lang="fr-CH" dirty="0"/>
+                  <a:t>V = énergie potentielle = dépend des angles</a:t>
+                </a:r>
+              </a:p>
+            </p:txBody>
+          </p:sp>
+        </mc:Choice>
+        <mc:Fallback>
+          <p:sp>
+            <p:nvSpPr>
+              <p:cNvPr id="3" name="Espace réservé des notes 2">
+                <a:extLst>
+                  <a:ext uri="{FF2B5EF4-FFF2-40B4-BE49-F238E27FC236}">
+                    <a16:creationId xmlns:a16="http://schemas.microsoft.com/office/drawing/2014/main" id="{8B662EDB-FE17-2C96-678B-4B2A953B2D3A}"/>
+                  </a:ext>
+                </a:extLst>
+              </p:cNvPr>
+              <p:cNvSpPr>
+                <a:spLocks noGrp="1"/>
+              </p:cNvSpPr>
+              <p:nvPr>
+                <p:ph type="body" idx="1"/>
+              </p:nvPr>
+            </p:nvSpPr>
+            <p:spPr/>
+            <p:txBody>
+              <a:bodyPr/>
+              <a:lstStyle/>
+              <a:p>
+                <a:r>
+                  <a:rPr lang="fr-FR" dirty="0"/>
+                  <a:t>Pour la mise en équation, je me suis appuyée sur le formalisme lagrangien, car il est adapté aux systèmes mécaniques complexes comme le double pendule.</a:t>
+                </a:r>
+              </a:p>
+              <a:p>
+                <a:endParaRPr lang="fr-FR" dirty="0"/>
+              </a:p>
+              <a:p>
+                <a:r>
+                  <a:rPr lang="fr-FR" dirty="0"/>
+                  <a:t>Le </a:t>
+                </a:r>
+                <a:r>
+                  <a:rPr lang="fr-FR" b="1" dirty="0"/>
+                  <a:t>Lagrangien</a:t>
+                </a:r>
+                <a:r>
+                  <a:rPr lang="fr-FR" dirty="0"/>
+                  <a:t> est une fonction qui décrit un système mécanique à partir de son énergie cinétique </a:t>
+                </a:r>
+                <a:r>
+                  <a:rPr lang="fr-FR" sz="1200" i="0" kern="1200">
+                    <a:solidFill>
+                      <a:schemeClr val="tx1"/>
+                    </a:solidFill>
+                    <a:latin typeface="+mn-lt"/>
+                    <a:ea typeface="+mn-ea"/>
+                    <a:cs typeface="+mn-cs"/>
+                  </a:rPr>
+                  <a:t>𝑇</a:t>
+                </a:r>
+                <a:r>
+                  <a:rPr lang="fr-FR" dirty="0"/>
+                  <a:t> et de son énergie potentielle </a:t>
+                </a:r>
+                <a:r>
+                  <a:rPr lang="fr-FR" sz="1200" i="0" kern="1200">
+                    <a:solidFill>
+                      <a:schemeClr val="tx1"/>
+                    </a:solidFill>
+                    <a:latin typeface="+mn-lt"/>
+                    <a:ea typeface="+mn-ea"/>
+                    <a:cs typeface="+mn-cs"/>
+                  </a:rPr>
+                  <a:t>𝑉</a:t>
+                </a:r>
+                <a:r>
+                  <a:rPr lang="fr-FR" dirty="0"/>
+                  <a:t>.</a:t>
+                </a:r>
+                <a:br>
+                  <a:rPr lang="fr-FR" dirty="0"/>
+                </a:br>
+                <a:r>
+                  <a:rPr lang="fr-FR" dirty="0"/>
+                  <a:t>Il sert de point de départ aux équations d’Euler–Lagrange pour obtenir les équations du mouvement.</a:t>
+                </a:r>
+                <a:endParaRPr lang="fr-CH" dirty="0"/>
+              </a:p>
+              <a:p>
+                <a:endParaRPr lang="fr-CH" dirty="0"/>
+              </a:p>
+              <a:p>
+                <a:r>
+                  <a:rPr lang="fr-CH" dirty="0"/>
+                  <a:t>T = énergie cinétique = dépend vitesse angulaires</a:t>
+                </a:r>
+              </a:p>
+              <a:p>
+                <a:r>
+                  <a:rPr lang="fr-CH" dirty="0"/>
+                  <a:t>V = énergie potentielle = dépend des angles</a:t>
+                </a:r>
+              </a:p>
+            </p:txBody>
+          </p:sp>
+        </mc:Fallback>
+      </mc:AlternateContent>
       <p:sp>
         <p:nvSpPr>
           <p:cNvPr id="4" name="Espace réservé du numéro de diapositive 3">
@@ -1313,7 +1266,7 @@
             <a:fld id="{9E3519E5-025F-4B1C-8C8E-E5E4EA4A6412}" type="slidenum">
               <a:rPr lang="fr-CH" smtClean="0"/>
               <a:pPr/>
-              <a:t>5</a:t>
+              <a:t>3</a:t>
             </a:fld>
             <a:endParaRPr lang="fr-CH"/>
           </a:p>
@@ -1332,7 +1285,7 @@
 </p:notes>
 </file>
 
-<file path=ppt/notesSlides/notesSlide6.xml><?xml version="1.0" encoding="utf-8"?>
+<file path=ppt/notesSlides/notesSlide4.xml><?xml version="1.0" encoding="utf-8"?>
 <p:notes xmlns:a="http://schemas.openxmlformats.org/drawingml/2006/main" xmlns:r="http://schemas.openxmlformats.org/officeDocument/2006/relationships" xmlns:p="http://schemas.openxmlformats.org/presentationml/2006/main">
   <p:cSld>
     <p:spTree>
@@ -1340,7 +1293,7 @@
         <p:cNvPr id="1" name="">
           <a:extLst>
             <a:ext uri="{FF2B5EF4-FFF2-40B4-BE49-F238E27FC236}">
-              <a16:creationId xmlns:a16="http://schemas.microsoft.com/office/drawing/2014/main" id="{192F44EF-A552-8222-73F4-DC6C8D049825}"/>
+              <a16:creationId xmlns:a16="http://schemas.microsoft.com/office/drawing/2014/main" id="{C702F842-941A-1E5A-59BE-A66E3B8072C2}"/>
             </a:ext>
           </a:extLst>
         </p:cNvPr>
@@ -1360,7 +1313,7 @@
           <p:cNvPr id="2" name="Espace réservé de l'image des diapositives 1">
             <a:extLst>
               <a:ext uri="{FF2B5EF4-FFF2-40B4-BE49-F238E27FC236}">
-                <a16:creationId xmlns:a16="http://schemas.microsoft.com/office/drawing/2014/main" id="{45BEEEBF-34F1-718F-72A3-B5A0617FA6DD}"/>
+                <a16:creationId xmlns:a16="http://schemas.microsoft.com/office/drawing/2014/main" id="{EF53FE5E-905D-6B5D-8D7C-59E60C5F9711}"/>
               </a:ext>
             </a:extLst>
           </p:cNvPr>
@@ -1373,42 +1326,668 @@
         </p:nvSpPr>
         <p:spPr>
           <a:xfrm>
-            <a:off x="138113" y="766763"/>
-            <a:ext cx="6823075" cy="3838575"/>
+            <a:off x="139700" y="766763"/>
+            <a:ext cx="6824663" cy="3838575"/>
           </a:xfrm>
         </p:spPr>
       </p:sp>
-      <p:sp>
-        <p:nvSpPr>
-          <p:cNvPr id="3" name="Espace réservé des notes 2">
-            <a:extLst>
-              <a:ext uri="{FF2B5EF4-FFF2-40B4-BE49-F238E27FC236}">
-                <a16:creationId xmlns:a16="http://schemas.microsoft.com/office/drawing/2014/main" id="{CA4A9752-EB20-D34D-3BF1-A001778E5A7F}"/>
-              </a:ext>
-            </a:extLst>
-          </p:cNvPr>
-          <p:cNvSpPr>
-            <a:spLocks noGrp="1"/>
-          </p:cNvSpPr>
-          <p:nvPr>
-            <p:ph type="body" idx="1"/>
-          </p:nvPr>
-        </p:nvSpPr>
-        <p:spPr/>
-        <p:txBody>
-          <a:bodyPr/>
-          <a:lstStyle/>
-          <a:p>
-            <a:endParaRPr lang="fr-CH" dirty="0"/>
-          </a:p>
-        </p:txBody>
-      </p:sp>
+      <mc:AlternateContent xmlns:mc="http://schemas.openxmlformats.org/markup-compatibility/2006">
+        <mc:Choice xmlns:a14="http://schemas.microsoft.com/office/drawing/2010/main" Requires="a14">
+          <p:sp>
+            <p:nvSpPr>
+              <p:cNvPr id="3" name="Espace réservé des notes 2">
+                <a:extLst>
+                  <a:ext uri="{FF2B5EF4-FFF2-40B4-BE49-F238E27FC236}">
+                    <a16:creationId xmlns:a16="http://schemas.microsoft.com/office/drawing/2014/main" id="{E94C2BCE-21D7-E3CE-EF76-8F42A624870B}"/>
+                  </a:ext>
+                </a:extLst>
+              </p:cNvPr>
+              <p:cNvSpPr>
+                <a:spLocks noGrp="1"/>
+              </p:cNvSpPr>
+              <p:nvPr>
+                <p:ph type="body" idx="1"/>
+              </p:nvPr>
+            </p:nvSpPr>
+            <p:spPr/>
+            <p:txBody>
+              <a:bodyPr/>
+              <a:lstStyle/>
+              <a:p>
+                <a:r>
+                  <a:rPr lang="fr-CH" dirty="0"/>
+                  <a:t>On a parlé de T et V dans la slide précédente, ici la vitesse angulaire correspond à la dérivée 1 et l’accélération angulaire correspond à la dérivée 2</a:t>
+                </a:r>
+              </a:p>
+              <a:p>
+                <a:endParaRPr lang="fr-CH" dirty="0"/>
+              </a:p>
+              <a:p>
+                <a:r>
+                  <a:rPr lang="fr-CH" dirty="0"/>
+                  <a:t>Nous avons ici la formule d’Euler-Lagrange</a:t>
+                </a:r>
+              </a:p>
+              <a:p>
+                <a:r>
+                  <a:rPr lang="fr-CH" dirty="0"/>
+                  <a:t>La formule se lit ainsi:</a:t>
+                </a:r>
+              </a:p>
+              <a:p>
+                <a14:m>
+                  <m:oMath xmlns:m="http://schemas.openxmlformats.org/officeDocument/2006/math">
+                    <m:f>
+                      <m:fPr>
+                        <m:ctrlPr>
+                          <a:rPr lang="ar-AE" sz="1200" kern="1200">
+                            <a:solidFill>
+                              <a:schemeClr val="tx1"/>
+                            </a:solidFill>
+                            <a:latin typeface="+mn-lt"/>
+                            <a:ea typeface="+mn-ea"/>
+                            <a:cs typeface="+mn-cs"/>
+                          </a:rPr>
+                        </m:ctrlPr>
+                      </m:fPr>
+                      <m:num>
+                        <m:r>
+                          <a:rPr lang="ar-AE" sz="1200" i="1" kern="1200">
+                            <a:solidFill>
+                              <a:schemeClr val="tx1"/>
+                            </a:solidFill>
+                            <a:latin typeface="+mn-lt"/>
+                            <a:ea typeface="+mn-ea"/>
+                            <a:cs typeface="+mn-cs"/>
+                          </a:rPr>
+                          <m:t>𝑑</m:t>
+                        </m:r>
+                      </m:num>
+                      <m:den>
+                        <m:r>
+                          <a:rPr lang="ar-AE" sz="1200" i="1" kern="1200">
+                            <a:solidFill>
+                              <a:schemeClr val="tx1"/>
+                            </a:solidFill>
+                            <a:latin typeface="+mn-lt"/>
+                            <a:ea typeface="+mn-ea"/>
+                            <a:cs typeface="+mn-cs"/>
+                          </a:rPr>
+                          <m:t>𝑑𝑡</m:t>
+                        </m:r>
+                      </m:den>
+                    </m:f>
+                    <m:d>
+                      <m:dPr>
+                        <m:ctrlPr>
+                          <a:rPr lang="ar-AE" sz="1200" i="1" kern="1200">
+                            <a:solidFill>
+                              <a:schemeClr val="tx1"/>
+                            </a:solidFill>
+                            <a:latin typeface="+mn-lt"/>
+                            <a:ea typeface="+mn-ea"/>
+                            <a:cs typeface="+mn-cs"/>
+                          </a:rPr>
+                        </m:ctrlPr>
+                      </m:dPr>
+                      <m:e>
+                        <m:r>
+                          <a:rPr lang="ar-AE" sz="1200" i="0" kern="1200">
+                            <a:solidFill>
+                              <a:schemeClr val="tx1"/>
+                            </a:solidFill>
+                            <a:latin typeface="+mn-lt"/>
+                            <a:ea typeface="+mn-ea"/>
+                            <a:cs typeface="+mn-cs"/>
+                          </a:rPr>
+                          <m:t>⋅</m:t>
+                        </m:r>
+                      </m:e>
+                    </m:d>
+                  </m:oMath>
+                </a14:m>
+                <a:r>
+                  <a:rPr lang="en-GB" b="1" dirty="0"/>
+                  <a:t> </a:t>
+                </a:r>
+              </a:p>
+              <a:p>
+                <a:r>
+                  <a:rPr lang="en-GB" b="0" dirty="0"/>
+                  <a:t>-</a:t>
+                </a:r>
+                <a:r>
+                  <a:rPr lang="en-GB" b="1" dirty="0"/>
+                  <a:t> </a:t>
+                </a:r>
+                <a:r>
+                  <a:rPr lang="fr-CH" dirty="0"/>
+                  <a:t>Prend en compte l’évolution temporelle</a:t>
+                </a:r>
+              </a:p>
+              <a:p>
+                <a:pPr marL="0" indent="0">
+                  <a:buFontTx/>
+                  <a:buNone/>
+                </a:pPr>
+                <a:r>
+                  <a:rPr lang="fr-CH" dirty="0"/>
+                  <a:t>- Introduit naturellement les accélérations</a:t>
+                </a:r>
+              </a:p>
+              <a:p>
+                <a:pPr marL="0" indent="0">
+                  <a:buFontTx/>
+                  <a:buNone/>
+                </a:pPr>
+                <a:endParaRPr lang="fr-CH" sz="1200" kern="1200" dirty="0">
+                  <a:solidFill>
+                    <a:schemeClr val="tx1"/>
+                  </a:solidFill>
+                  <a:latin typeface="+mn-lt"/>
+                  <a:ea typeface="+mn-ea"/>
+                  <a:cs typeface="+mn-cs"/>
+                </a:endParaRPr>
+              </a:p>
+              <a:p>
+                <a:pPr marL="0" indent="0">
+                  <a:buFontTx/>
+                  <a:buNone/>
+                </a:pPr>
+                <a14:m>
+                  <m:oMathPara xmlns:m="http://schemas.openxmlformats.org/officeDocument/2006/math">
+                    <m:oMathParaPr>
+                      <m:jc m:val="left"/>
+                    </m:oMathParaPr>
+                    <m:oMath xmlns:m="http://schemas.openxmlformats.org/officeDocument/2006/math">
+                      <m:f>
+                        <m:fPr>
+                          <m:ctrlPr>
+                            <a:rPr lang="ar-AE" sz="1200" kern="1200">
+                              <a:solidFill>
+                                <a:schemeClr val="tx1"/>
+                              </a:solidFill>
+                              <a:latin typeface="+mn-lt"/>
+                              <a:ea typeface="+mn-ea"/>
+                              <a:cs typeface="+mn-cs"/>
+                            </a:rPr>
+                          </m:ctrlPr>
+                        </m:fPr>
+                        <m:num>
+                          <m:r>
+                            <a:rPr lang="ar-AE" sz="1200" kern="1200">
+                              <a:solidFill>
+                                <a:schemeClr val="tx1"/>
+                              </a:solidFill>
+                              <a:latin typeface="+mn-lt"/>
+                              <a:ea typeface="+mn-ea"/>
+                              <a:cs typeface="+mn-cs"/>
+                            </a:rPr>
+                            <m:t>∂</m:t>
+                          </m:r>
+                          <m:r>
+                            <a:rPr lang="ar-AE" sz="1200" i="1" kern="1200">
+                              <a:solidFill>
+                                <a:schemeClr val="tx1"/>
+                              </a:solidFill>
+                              <a:latin typeface="+mn-lt"/>
+                              <a:ea typeface="+mn-ea"/>
+                              <a:cs typeface="+mn-cs"/>
+                            </a:rPr>
+                            <m:t>𝐿</m:t>
+                          </m:r>
+                        </m:num>
+                        <m:den>
+                          <m:r>
+                            <a:rPr lang="ar-AE" sz="1200" i="0" kern="1200">
+                              <a:solidFill>
+                                <a:schemeClr val="tx1"/>
+                              </a:solidFill>
+                              <a:latin typeface="+mn-lt"/>
+                              <a:ea typeface="+mn-ea"/>
+                              <a:cs typeface="+mn-cs"/>
+                            </a:rPr>
+                            <m:t>∂</m:t>
+                          </m:r>
+                          <m:sSub>
+                            <m:sSubPr>
+                              <m:ctrlPr>
+                                <a:rPr lang="ar-AE" sz="1200" i="1" kern="1200">
+                                  <a:solidFill>
+                                    <a:schemeClr val="tx1"/>
+                                  </a:solidFill>
+                                  <a:latin typeface="+mn-lt"/>
+                                  <a:ea typeface="+mn-ea"/>
+                                  <a:cs typeface="+mn-cs"/>
+                                </a:rPr>
+                              </m:ctrlPr>
+                            </m:sSubPr>
+                            <m:e>
+                              <m:acc>
+                                <m:accPr>
+                                  <m:chr m:val="̇"/>
+                                  <m:ctrlPr>
+                                    <a:rPr lang="ar-AE" sz="1200" i="1" kern="1200">
+                                      <a:solidFill>
+                                        <a:schemeClr val="tx1"/>
+                                      </a:solidFill>
+                                      <a:latin typeface="+mn-lt"/>
+                                      <a:ea typeface="+mn-ea"/>
+                                      <a:cs typeface="+mn-cs"/>
+                                    </a:rPr>
+                                  </m:ctrlPr>
+                                </m:accPr>
+                                <m:e>
+                                  <m:r>
+                                    <a:rPr lang="ar-AE" sz="1200" i="1" kern="1200">
+                                      <a:solidFill>
+                                        <a:schemeClr val="tx1"/>
+                                      </a:solidFill>
+                                      <a:latin typeface="+mn-lt"/>
+                                      <a:ea typeface="+mn-ea"/>
+                                      <a:cs typeface="+mn-cs"/>
+                                    </a:rPr>
+                                    <m:t>𝜃</m:t>
+                                  </m:r>
+                                </m:e>
+                              </m:acc>
+                            </m:e>
+                            <m:sub>
+                              <m:r>
+                                <a:rPr lang="ar-AE" sz="1200" i="1" kern="1200">
+                                  <a:solidFill>
+                                    <a:schemeClr val="tx1"/>
+                                  </a:solidFill>
+                                  <a:latin typeface="+mn-lt"/>
+                                  <a:ea typeface="+mn-ea"/>
+                                  <a:cs typeface="+mn-cs"/>
+                                </a:rPr>
+                                <m:t>𝑖</m:t>
+                              </m:r>
+                            </m:sub>
+                          </m:sSub>
+                        </m:den>
+                      </m:f>
+                    </m:oMath>
+                  </m:oMathPara>
+                </a14:m>
+                <a:endParaRPr lang="fr-CH" dirty="0"/>
+              </a:p>
+              <a:p>
+                <a:r>
+                  <a:rPr lang="fr-CH" dirty="0"/>
+                  <a:t>- </a:t>
+                </a:r>
+                <a:r>
+                  <a:rPr lang="fr-FR" dirty="0"/>
+                  <a:t>Lié à la </a:t>
+                </a:r>
+                <a:r>
+                  <a:rPr lang="fr-FR" b="1" dirty="0"/>
+                  <a:t>quantité de mouvement généralisée</a:t>
+                </a:r>
+                <a:endParaRPr lang="fr-FR" dirty="0"/>
+              </a:p>
+              <a:p>
+                <a:pPr marL="0" indent="0">
+                  <a:buFontTx/>
+                  <a:buNone/>
+                </a:pPr>
+                <a:r>
+                  <a:rPr lang="fr-FR" dirty="0"/>
+                  <a:t>- Provient de l’énergie cinétique</a:t>
+                </a:r>
+              </a:p>
+              <a:p>
+                <a:pPr marL="171450" indent="-171450">
+                  <a:buFontTx/>
+                  <a:buChar char="-"/>
+                </a:pPr>
+                <a:endParaRPr lang="fr-FR" dirty="0"/>
+              </a:p>
+              <a:p>
+                <a:pPr marL="0" indent="0">
+                  <a:buFontTx/>
+                  <a:buNone/>
+                </a:pPr>
+                <a14:m>
+                  <m:oMathPara xmlns:m="http://schemas.openxmlformats.org/officeDocument/2006/math">
+                    <m:oMathParaPr>
+                      <m:jc m:val="left"/>
+                    </m:oMathParaPr>
+                    <m:oMath xmlns:m="http://schemas.openxmlformats.org/officeDocument/2006/math">
+                      <m:f>
+                        <m:fPr>
+                          <m:ctrlPr>
+                            <a:rPr lang="fr-CH" sz="1200" kern="1200" smtClean="0">
+                              <a:solidFill>
+                                <a:schemeClr val="tx1"/>
+                              </a:solidFill>
+                              <a:latin typeface="+mn-lt"/>
+                              <a:ea typeface="+mn-ea"/>
+                              <a:cs typeface="+mn-cs"/>
+                            </a:rPr>
+                          </m:ctrlPr>
+                        </m:fPr>
+                        <m:num>
+                          <m:r>
+                            <a:rPr lang="fr-CH" sz="1200" kern="1200">
+                              <a:solidFill>
+                                <a:schemeClr val="tx1"/>
+                              </a:solidFill>
+                              <a:latin typeface="+mn-lt"/>
+                              <a:ea typeface="+mn-ea"/>
+                              <a:cs typeface="+mn-cs"/>
+                            </a:rPr>
+                            <m:t>∂</m:t>
+                          </m:r>
+                          <m:r>
+                            <a:rPr lang="fr-CH" sz="1200" i="1" kern="1200">
+                              <a:solidFill>
+                                <a:schemeClr val="tx1"/>
+                              </a:solidFill>
+                              <a:latin typeface="+mn-lt"/>
+                              <a:ea typeface="+mn-ea"/>
+                              <a:cs typeface="+mn-cs"/>
+                            </a:rPr>
+                            <m:t>𝐿</m:t>
+                          </m:r>
+                        </m:num>
+                        <m:den>
+                          <m:r>
+                            <a:rPr lang="fr-CH" sz="1200" i="0" kern="1200">
+                              <a:solidFill>
+                                <a:schemeClr val="tx1"/>
+                              </a:solidFill>
+                              <a:latin typeface="+mn-lt"/>
+                              <a:ea typeface="+mn-ea"/>
+                              <a:cs typeface="+mn-cs"/>
+                            </a:rPr>
+                            <m:t>∂</m:t>
+                          </m:r>
+                          <m:sSub>
+                            <m:sSubPr>
+                              <m:ctrlPr>
+                                <a:rPr lang="fr-CH" sz="1200" i="1" kern="1200">
+                                  <a:solidFill>
+                                    <a:schemeClr val="tx1"/>
+                                  </a:solidFill>
+                                  <a:latin typeface="+mn-lt"/>
+                                  <a:ea typeface="+mn-ea"/>
+                                  <a:cs typeface="+mn-cs"/>
+                                </a:rPr>
+                              </m:ctrlPr>
+                            </m:sSubPr>
+                            <m:e>
+                              <m:r>
+                                <a:rPr lang="fr-CH" sz="1200" i="1" kern="1200">
+                                  <a:solidFill>
+                                    <a:schemeClr val="tx1"/>
+                                  </a:solidFill>
+                                  <a:latin typeface="+mn-lt"/>
+                                  <a:ea typeface="+mn-ea"/>
+                                  <a:cs typeface="+mn-cs"/>
+                                </a:rPr>
+                                <m:t>𝜃</m:t>
+                              </m:r>
+                            </m:e>
+                            <m:sub>
+                              <m:r>
+                                <a:rPr lang="fr-CH" sz="1200" i="1" kern="1200">
+                                  <a:solidFill>
+                                    <a:schemeClr val="tx1"/>
+                                  </a:solidFill>
+                                  <a:latin typeface="+mn-lt"/>
+                                  <a:ea typeface="+mn-ea"/>
+                                  <a:cs typeface="+mn-cs"/>
+                                </a:rPr>
+                                <m:t>𝑖</m:t>
+                              </m:r>
+                            </m:sub>
+                          </m:sSub>
+                        </m:den>
+                      </m:f>
+                    </m:oMath>
+                  </m:oMathPara>
+                </a14:m>
+                <a:endParaRPr lang="fr-FR" dirty="0"/>
+              </a:p>
+              <a:p>
+                <a:r>
+                  <a:rPr lang="fr-FR" dirty="0"/>
+                  <a:t>- Terme lié à l’énergie potentielle</a:t>
+                </a:r>
+              </a:p>
+              <a:p>
+                <a:r>
+                  <a:rPr lang="fr-FR" dirty="0"/>
+                  <a:t>- Représente l’effet de la gravité</a:t>
+                </a:r>
+              </a:p>
+              <a:p>
+                <a:pPr marL="0" indent="0">
+                  <a:buFontTx/>
+                  <a:buNone/>
+                </a:pPr>
+                <a:endParaRPr lang="fr-FR" dirty="0"/>
+              </a:p>
+              <a:p>
+                <a:pPr marL="0" indent="0">
+                  <a:buFontTx/>
+                  <a:buNone/>
+                </a:pPr>
+                <a:endParaRPr lang="fr-CH" dirty="0"/>
+              </a:p>
+              <a:p>
+                <a:endParaRPr lang="fr-CH" dirty="0"/>
+              </a:p>
+            </p:txBody>
+          </p:sp>
+        </mc:Choice>
+        <mc:Fallback>
+          <p:sp>
+            <p:nvSpPr>
+              <p:cNvPr id="3" name="Espace réservé des notes 2">
+                <a:extLst>
+                  <a:ext uri="{FF2B5EF4-FFF2-40B4-BE49-F238E27FC236}">
+                    <a16:creationId xmlns:a16="http://schemas.microsoft.com/office/drawing/2014/main" id="{E94C2BCE-21D7-E3CE-EF76-8F42A624870B}"/>
+                  </a:ext>
+                </a:extLst>
+              </p:cNvPr>
+              <p:cNvSpPr>
+                <a:spLocks noGrp="1"/>
+              </p:cNvSpPr>
+              <p:nvPr>
+                <p:ph type="body" idx="1"/>
+              </p:nvPr>
+            </p:nvSpPr>
+            <p:spPr/>
+            <p:txBody>
+              <a:bodyPr/>
+              <a:lstStyle/>
+              <a:p>
+                <a:r>
+                  <a:rPr lang="fr-CH" dirty="0"/>
+                  <a:t>On a parlé de T et V dans la slide précédente, ici la vitesse angulaire correspond à la dérivée 1 et l’accélération angulaire correspond à la dérivée 2</a:t>
+                </a:r>
+              </a:p>
+              <a:p>
+                <a:endParaRPr lang="fr-CH" dirty="0"/>
+              </a:p>
+              <a:p>
+                <a:r>
+                  <a:rPr lang="fr-CH" dirty="0"/>
+                  <a:t>Nous avons ici la formule d’Euler-Lagrange</a:t>
+                </a:r>
+              </a:p>
+              <a:p>
+                <a:r>
+                  <a:rPr lang="fr-CH" dirty="0"/>
+                  <a:t>La formule se lit ainsi:</a:t>
+                </a:r>
+              </a:p>
+              <a:p>
+                <a:r>
+                  <a:rPr lang="ar-AE" sz="1200" i="0" kern="1200">
+                    <a:solidFill>
+                      <a:schemeClr val="tx1"/>
+                    </a:solidFill>
+                    <a:latin typeface="+mn-lt"/>
+                    <a:ea typeface="+mn-ea"/>
+                    <a:cs typeface="+mn-cs"/>
+                  </a:rPr>
+                  <a:t>𝑑/𝑑𝑡 (⋅)</a:t>
+                </a:r>
+                <a:r>
+                  <a:rPr lang="en-GB" b="1" dirty="0"/>
+                  <a:t> </a:t>
+                </a:r>
+              </a:p>
+              <a:p>
+                <a:r>
+                  <a:rPr lang="en-GB" b="0" dirty="0"/>
+                  <a:t>-</a:t>
+                </a:r>
+                <a:r>
+                  <a:rPr lang="en-GB" b="1" dirty="0"/>
+                  <a:t> </a:t>
+                </a:r>
+                <a:r>
+                  <a:rPr lang="fr-CH" dirty="0"/>
+                  <a:t>Prend en compte l’évolution temporelle</a:t>
+                </a:r>
+              </a:p>
+              <a:p>
+                <a:pPr marL="0" indent="0">
+                  <a:buFontTx/>
+                  <a:buNone/>
+                </a:pPr>
+                <a:r>
+                  <a:rPr lang="fr-CH" dirty="0"/>
+                  <a:t>- Introduit naturellement les accélérations</a:t>
+                </a:r>
+              </a:p>
+              <a:p>
+                <a:pPr marL="0" indent="0">
+                  <a:buFontTx/>
+                  <a:buNone/>
+                </a:pPr>
+                <a:endParaRPr lang="fr-CH" sz="1200" kern="1200" dirty="0">
+                  <a:solidFill>
+                    <a:schemeClr val="tx1"/>
+                  </a:solidFill>
+                  <a:latin typeface="+mn-lt"/>
+                  <a:ea typeface="+mn-ea"/>
+                  <a:cs typeface="+mn-cs"/>
+                </a:endParaRPr>
+              </a:p>
+              <a:p>
+                <a:pPr marL="0" indent="0">
+                  <a:buFontTx/>
+                  <a:buNone/>
+                </a:pPr>
+                <a:r>
+                  <a:rPr lang="ar-AE" sz="1200" i="0" kern="1200">
+                    <a:solidFill>
+                      <a:schemeClr val="tx1"/>
+                    </a:solidFill>
+                    <a:latin typeface="+mn-lt"/>
+                    <a:ea typeface="+mn-ea"/>
+                    <a:cs typeface="+mn-cs"/>
+                  </a:rPr>
+                  <a:t>∂𝐿/(∂𝜃 ̇_𝑖 )</a:t>
+                </a:r>
+                <a:endParaRPr lang="fr-CH" dirty="0"/>
+              </a:p>
+              <a:p>
+                <a:r>
+                  <a:rPr lang="fr-CH" dirty="0"/>
+                  <a:t>- </a:t>
+                </a:r>
+                <a:r>
+                  <a:rPr lang="fr-FR" dirty="0"/>
+                  <a:t>Lié à la </a:t>
+                </a:r>
+                <a:r>
+                  <a:rPr lang="fr-FR" b="1" dirty="0"/>
+                  <a:t>quantité de mouvement généralisée</a:t>
+                </a:r>
+                <a:endParaRPr lang="fr-FR" dirty="0"/>
+              </a:p>
+              <a:p>
+                <a:pPr marL="0" indent="0">
+                  <a:buFontTx/>
+                  <a:buNone/>
+                </a:pPr>
+                <a:r>
+                  <a:rPr lang="fr-FR" dirty="0"/>
+                  <a:t>- Provient de l’énergie cinétique</a:t>
+                </a:r>
+              </a:p>
+              <a:p>
+                <a:pPr marL="171450" indent="-171450">
+                  <a:buFontTx/>
+                  <a:buChar char="-"/>
+                </a:pPr>
+                <a:endParaRPr lang="fr-FR" dirty="0"/>
+              </a:p>
+              <a:p>
+                <a:pPr marL="0" indent="0">
+                  <a:buFontTx/>
+                  <a:buNone/>
+                </a:pPr>
+                <a:r>
+                  <a:rPr lang="fr-CH" sz="1200" i="0" kern="1200">
+                    <a:solidFill>
+                      <a:schemeClr val="tx1"/>
+                    </a:solidFill>
+                    <a:latin typeface="+mn-lt"/>
+                    <a:ea typeface="+mn-ea"/>
+                    <a:cs typeface="+mn-cs"/>
+                  </a:rPr>
+                  <a:t>∂𝐿/(∂𝜃_𝑖 )</a:t>
+                </a:r>
+                <a:endParaRPr lang="fr-FR" dirty="0"/>
+              </a:p>
+              <a:p>
+                <a:r>
+                  <a:rPr lang="fr-FR" dirty="0"/>
+                  <a:t>- Terme lié à l’énergie potentielle</a:t>
+                </a:r>
+              </a:p>
+              <a:p>
+                <a:r>
+                  <a:rPr lang="fr-FR" dirty="0"/>
+                  <a:t>- Représente l’effet de la gravité</a:t>
+                </a:r>
+              </a:p>
+              <a:p>
+                <a:pPr marL="0" indent="0">
+                  <a:buFontTx/>
+                  <a:buNone/>
+                </a:pPr>
+                <a:endParaRPr lang="fr-FR" dirty="0"/>
+              </a:p>
+              <a:p>
+                <a:pPr marL="0" indent="0">
+                  <a:buFontTx/>
+                  <a:buNone/>
+                </a:pPr>
+                <a:endParaRPr lang="fr-CH" dirty="0"/>
+              </a:p>
+              <a:p>
+                <a:endParaRPr lang="fr-CH" dirty="0"/>
+              </a:p>
+            </p:txBody>
+          </p:sp>
+        </mc:Fallback>
+      </mc:AlternateContent>
       <p:sp>
         <p:nvSpPr>
           <p:cNvPr id="4" name="Espace réservé du numéro de diapositive 3">
             <a:extLst>
               <a:ext uri="{FF2B5EF4-FFF2-40B4-BE49-F238E27FC236}">
-                <a16:creationId xmlns:a16="http://schemas.microsoft.com/office/drawing/2014/main" id="{058BEF5E-7E42-0AB0-80F7-F8A728CBA660}"/>
+                <a16:creationId xmlns:a16="http://schemas.microsoft.com/office/drawing/2014/main" id="{612BE95E-6DF8-3F13-7D6D-4F8BDA52633C}"/>
               </a:ext>
             </a:extLst>
           </p:cNvPr>
@@ -1427,7 +2006,7 @@
             <a:fld id="{9E3519E5-025F-4B1C-8C8E-E5E4EA4A6412}" type="slidenum">
               <a:rPr lang="fr-CH" smtClean="0"/>
               <a:pPr/>
-              <a:t>6</a:t>
+              <a:t>4</a:t>
             </a:fld>
             <a:endParaRPr lang="fr-CH"/>
           </a:p>
@@ -1436,7 +2015,7 @@
     </p:spTree>
     <p:extLst>
       <p:ext uri="{BB962C8B-B14F-4D97-AF65-F5344CB8AC3E}">
-        <p14:creationId xmlns:p14="http://schemas.microsoft.com/office/powerpoint/2010/main" val="4256261337"/>
+        <p14:creationId xmlns:p14="http://schemas.microsoft.com/office/powerpoint/2010/main" val="3106880647"/>
       </p:ext>
     </p:extLst>
   </p:cSld>
@@ -1446,7 +2025,7 @@
 </p:notes>
 </file>
 
-<file path=ppt/notesSlides/notesSlide7.xml><?xml version="1.0" encoding="utf-8"?>
+<file path=ppt/notesSlides/notesSlide5.xml><?xml version="1.0" encoding="utf-8"?>
 <p:notes xmlns:a="http://schemas.openxmlformats.org/drawingml/2006/main" xmlns:r="http://schemas.openxmlformats.org/officeDocument/2006/relationships" xmlns:p="http://schemas.openxmlformats.org/presentationml/2006/main">
   <p:cSld>
     <p:spTree>
@@ -1487,8 +2066,8 @@
         </p:nvSpPr>
         <p:spPr>
           <a:xfrm>
-            <a:off x="138113" y="766763"/>
-            <a:ext cx="6823075" cy="3838575"/>
+            <a:off x="139700" y="766763"/>
+            <a:ext cx="6824663" cy="3838575"/>
           </a:xfrm>
         </p:spPr>
       </p:sp>
@@ -1513,6 +2092,47 @@
           <a:bodyPr/>
           <a:lstStyle/>
           <a:p>
+            <a:r>
+              <a:rPr lang="fr-CH" dirty="0"/>
+              <a:t>Mais dans notre cas, l’énergie mécanique dois rester constante dû aux formules lagrangiennes.</a:t>
+            </a:r>
+          </a:p>
+          <a:p>
+            <a:endParaRPr lang="fr-CH" dirty="0"/>
+          </a:p>
+          <a:p>
+            <a:r>
+              <a:rPr lang="fr-CH" dirty="0"/>
+              <a:t>Il peut avoir des légères pertes dû aux arrondis, méthode d’intégration ou la taille du pas de temps.</a:t>
+            </a:r>
+          </a:p>
+          <a:p>
+            <a:endParaRPr lang="fr-CH" dirty="0"/>
+          </a:p>
+          <a:p>
+            <a:r>
+              <a:rPr lang="fr-CH" dirty="0"/>
+              <a:t>[Formule]</a:t>
+            </a:r>
+          </a:p>
+          <a:p>
+            <a:r>
+              <a:rPr lang="fr-CH" dirty="0"/>
+              <a:t>[Explication formule énergie de base]</a:t>
+            </a:r>
+          </a:p>
+          <a:p>
+            <a:r>
+              <a:rPr lang="fr-FR" dirty="0"/>
+              <a:t>Le Hamiltonien représente l’énergie mécanique totale du système.</a:t>
+            </a:r>
+            <a:br>
+              <a:rPr lang="fr-FR" dirty="0"/>
+            </a:br>
+            <a:r>
+              <a:rPr lang="fr-FR" dirty="0"/>
+              <a:t>Dans le cas idéal du double pendule, il est conservé et peut être utilisé comme critère pour vérifier la qualité d’une simulation numérique.</a:t>
+            </a:r>
             <a:endParaRPr lang="fr-CH" dirty="0"/>
           </a:p>
         </p:txBody>
@@ -1541,7 +2161,7 @@
             <a:fld id="{9E3519E5-025F-4B1C-8C8E-E5E4EA4A6412}" type="slidenum">
               <a:rPr lang="fr-CH" smtClean="0"/>
               <a:pPr/>
-              <a:t>7</a:t>
+              <a:t>5</a:t>
             </a:fld>
             <a:endParaRPr lang="fr-CH"/>
           </a:p>
@@ -1560,7 +2180,7 @@
 </p:notes>
 </file>
 
-<file path=ppt/notesSlides/notesSlide8.xml><?xml version="1.0" encoding="utf-8"?>
+<file path=ppt/notesSlides/notesSlide6.xml><?xml version="1.0" encoding="utf-8"?>
 <p:notes xmlns:a="http://schemas.openxmlformats.org/drawingml/2006/main" xmlns:r="http://schemas.openxmlformats.org/officeDocument/2006/relationships" xmlns:p="http://schemas.openxmlformats.org/presentationml/2006/main">
   <p:cSld>
     <p:spTree>
@@ -1601,8 +2221,8 @@
         </p:nvSpPr>
         <p:spPr>
           <a:xfrm>
-            <a:off x="138113" y="766763"/>
-            <a:ext cx="6823075" cy="3838575"/>
+            <a:off x="139700" y="766763"/>
+            <a:ext cx="6824663" cy="3838575"/>
           </a:xfrm>
         </p:spPr>
       </p:sp>
@@ -1655,7 +2275,7 @@
             <a:fld id="{9E3519E5-025F-4B1C-8C8E-E5E4EA4A6412}" type="slidenum">
               <a:rPr lang="fr-CH" smtClean="0"/>
               <a:pPr/>
-              <a:t>8</a:t>
+              <a:t>6</a:t>
             </a:fld>
             <a:endParaRPr lang="fr-CH"/>
           </a:p>
@@ -9834,480 +10454,6 @@
         <p:cNvPr id="1" name="">
           <a:extLst>
             <a:ext uri="{FF2B5EF4-FFF2-40B4-BE49-F238E27FC236}">
-              <a16:creationId xmlns:a16="http://schemas.microsoft.com/office/drawing/2014/main" id="{6F559642-E5B6-BC45-0BE3-3AEE4B86F4FB}"/>
-            </a:ext>
-          </a:extLst>
-        </p:cNvPr>
-        <p:cNvGrpSpPr/>
-        <p:nvPr/>
-      </p:nvGrpSpPr>
-      <p:grpSpPr>
-        <a:xfrm>
-          <a:off x="0" y="0"/>
-          <a:ext cx="0" cy="0"/>
-          <a:chOff x="0" y="0"/>
-          <a:chExt cx="0" cy="0"/>
-        </a:xfrm>
-      </p:grpSpPr>
-      <p:sp>
-        <p:nvSpPr>
-          <p:cNvPr id="2" name="Title 1">
-            <a:extLst>
-              <a:ext uri="{FF2B5EF4-FFF2-40B4-BE49-F238E27FC236}">
-                <a16:creationId xmlns:a16="http://schemas.microsoft.com/office/drawing/2014/main" id="{D2D5B988-C23F-CA48-9881-12F56D4BFF45}"/>
-              </a:ext>
-            </a:extLst>
-          </p:cNvPr>
-          <p:cNvSpPr>
-            <a:spLocks noGrp="1"/>
-          </p:cNvSpPr>
-          <p:nvPr>
-            <p:ph type="title"/>
-          </p:nvPr>
-        </p:nvSpPr>
-        <p:spPr/>
-        <p:txBody>
-          <a:bodyPr/>
-          <a:lstStyle/>
-          <a:p>
-            <a:r>
-              <a:rPr lang="fr-CH" dirty="0"/>
-              <a:t>Présentation du projet </a:t>
-            </a:r>
-            <a:r>
-              <a:rPr lang="fr-CH" dirty="0">
-                <a:solidFill>
-                  <a:srgbClr val="FF0000"/>
-                </a:solidFill>
-              </a:rPr>
-              <a:t>(2 minutes)</a:t>
-            </a:r>
-            <a:endParaRPr lang="en-US" dirty="0">
-              <a:solidFill>
-                <a:srgbClr val="FF0000"/>
-              </a:solidFill>
-            </a:endParaRPr>
-          </a:p>
-        </p:txBody>
-      </p:sp>
-      <p:sp>
-        <p:nvSpPr>
-          <p:cNvPr id="3" name="Content Placeholder 2">
-            <a:extLst>
-              <a:ext uri="{FF2B5EF4-FFF2-40B4-BE49-F238E27FC236}">
-                <a16:creationId xmlns:a16="http://schemas.microsoft.com/office/drawing/2014/main" id="{3B001909-4B88-F51A-76B3-9D2C5828DD9D}"/>
-              </a:ext>
-            </a:extLst>
-          </p:cNvPr>
-          <p:cNvSpPr>
-            <a:spLocks noGrp="1"/>
-          </p:cNvSpPr>
-          <p:nvPr>
-            <p:ph sz="half" idx="1"/>
-          </p:nvPr>
-        </p:nvSpPr>
-        <p:spPr>
-          <a:xfrm>
-            <a:off x="497570" y="1393312"/>
-            <a:ext cx="11143046" cy="4916008"/>
-          </a:xfrm>
-        </p:spPr>
-        <p:txBody>
-          <a:bodyPr>
-            <a:normAutofit/>
-          </a:bodyPr>
-          <a:lstStyle/>
-          <a:p>
-            <a:pPr>
-              <a:buClr>
-                <a:schemeClr val="accent2"/>
-              </a:buClr>
-              <a:buSzPct val="100000"/>
-              <a:buFont typeface="Arial" panose="020B0604020202020204" pitchFamily="34" charset="0"/>
-              <a:buChar char="•"/>
-            </a:pPr>
-            <a:r>
-              <a:rPr lang="fr-CH" sz="2400" b="1" dirty="0"/>
-              <a:t>Contexte et problématique</a:t>
-            </a:r>
-          </a:p>
-          <a:p>
-            <a:pPr>
-              <a:buClr>
-                <a:schemeClr val="accent2"/>
-              </a:buClr>
-              <a:buSzPct val="100000"/>
-              <a:buFont typeface="Arial" panose="020B0604020202020204" pitchFamily="34" charset="0"/>
-              <a:buChar char="•"/>
-            </a:pPr>
-            <a:endParaRPr lang="fr-CH" sz="2400" b="1" dirty="0"/>
-          </a:p>
-          <a:p>
-            <a:pPr>
-              <a:buClr>
-                <a:schemeClr val="accent2"/>
-              </a:buClr>
-              <a:buSzPct val="100000"/>
-              <a:buFont typeface="Arial" panose="020B0604020202020204" pitchFamily="34" charset="0"/>
-              <a:buChar char="•"/>
-            </a:pPr>
-            <a:r>
-              <a:rPr lang="fr-CH" sz="2400" b="1" dirty="0"/>
-              <a:t>Objectif(s)</a:t>
-            </a:r>
-          </a:p>
-          <a:p>
-            <a:pPr>
-              <a:buClr>
-                <a:schemeClr val="accent2"/>
-              </a:buClr>
-              <a:buSzPct val="100000"/>
-              <a:buFont typeface="Arial" panose="020B0604020202020204" pitchFamily="34" charset="0"/>
-              <a:buChar char="•"/>
-            </a:pPr>
-            <a:endParaRPr lang="fr-CH" sz="2400" b="1" dirty="0"/>
-          </a:p>
-          <a:p>
-            <a:pPr>
-              <a:buClr>
-                <a:schemeClr val="accent2"/>
-              </a:buClr>
-              <a:buSzPct val="100000"/>
-              <a:buFont typeface="Arial" panose="020B0604020202020204" pitchFamily="34" charset="0"/>
-              <a:buChar char="•"/>
-            </a:pPr>
-            <a:r>
-              <a:rPr lang="fr-CH" sz="2400" b="1" dirty="0"/>
-              <a:t>Méthodes</a:t>
-            </a:r>
-            <a:endParaRPr lang="fr-CH" sz="2000" b="1" dirty="0"/>
-          </a:p>
-        </p:txBody>
-      </p:sp>
-      <p:sp>
-        <p:nvSpPr>
-          <p:cNvPr id="7" name="Slide Number Placeholder 6">
-            <a:extLst>
-              <a:ext uri="{FF2B5EF4-FFF2-40B4-BE49-F238E27FC236}">
-                <a16:creationId xmlns:a16="http://schemas.microsoft.com/office/drawing/2014/main" id="{0AD6605D-9557-F1EA-8AFA-610CFA9309FB}"/>
-              </a:ext>
-            </a:extLst>
-          </p:cNvPr>
-          <p:cNvSpPr>
-            <a:spLocks noGrp="1"/>
-          </p:cNvSpPr>
-          <p:nvPr>
-            <p:ph type="sldNum" sz="quarter" idx="4"/>
-          </p:nvPr>
-        </p:nvSpPr>
-        <p:spPr/>
-        <p:txBody>
-          <a:bodyPr/>
-          <a:lstStyle/>
-          <a:p>
-            <a:fld id="{23C040C7-4060-4381-887A-2EF827EF70EC}" type="slidenum">
-              <a:rPr lang="fr-CH" smtClean="0"/>
-              <a:pPr/>
-              <a:t>2</a:t>
-            </a:fld>
-            <a:endParaRPr lang="fr-CH"/>
-          </a:p>
-        </p:txBody>
-      </p:sp>
-      <p:sp>
-        <p:nvSpPr>
-          <p:cNvPr id="4" name="Date Placeholder 3">
-            <a:extLst>
-              <a:ext uri="{FF2B5EF4-FFF2-40B4-BE49-F238E27FC236}">
-                <a16:creationId xmlns:a16="http://schemas.microsoft.com/office/drawing/2014/main" id="{F156BF36-D049-3ACF-0CE7-9D7DD7DA97F6}"/>
-              </a:ext>
-            </a:extLst>
-          </p:cNvPr>
-          <p:cNvSpPr txBox="1">
-            <a:spLocks/>
-          </p:cNvSpPr>
-          <p:nvPr/>
-        </p:nvSpPr>
-        <p:spPr>
-          <a:xfrm>
-            <a:off x="241003" y="6520260"/>
-            <a:ext cx="2844800" cy="221109"/>
-          </a:xfrm>
-          <a:prstGeom prst="rect">
-            <a:avLst/>
-          </a:prstGeom>
-        </p:spPr>
-        <p:txBody>
-          <a:bodyPr vert="horz" lIns="91440" tIns="45720" rIns="91440" bIns="45720" rtlCol="0" anchor="ctr">
-            <a:normAutofit fontScale="92500" lnSpcReduction="10000"/>
-          </a:bodyPr>
-          <a:lstStyle>
-            <a:lvl1pPr marL="342900" indent="-342900" algn="l" defTabSz="914400" rtl="0" eaLnBrk="1" latinLnBrk="0" hangingPunct="1">
-              <a:spcBef>
-                <a:spcPct val="20000"/>
-              </a:spcBef>
-              <a:buClr>
-                <a:schemeClr val="accent1">
-                  <a:lumMod val="75000"/>
-                </a:schemeClr>
-              </a:buClr>
-              <a:buSzPct val="50000"/>
-              <a:buFont typeface="Inter Light" panose="02000503000000020004" pitchFamily="2" charset="0"/>
-              <a:buChar char="►"/>
-              <a:defRPr sz="2800" kern="1200">
-                <a:solidFill>
-                  <a:schemeClr val="tx1"/>
-                </a:solidFill>
-                <a:latin typeface="Open Sans" pitchFamily="2" charset="0"/>
-                <a:ea typeface="Open Sans" pitchFamily="2" charset="0"/>
-                <a:cs typeface="Open Sans" pitchFamily="2" charset="0"/>
-              </a:defRPr>
-            </a:lvl1pPr>
-            <a:lvl2pPr marL="742950" indent="-285750" algn="l" defTabSz="914400" rtl="0" eaLnBrk="1" latinLnBrk="0" hangingPunct="1">
-              <a:spcBef>
-                <a:spcPct val="20000"/>
-              </a:spcBef>
-              <a:buClr>
-                <a:schemeClr val="accent1">
-                  <a:lumMod val="75000"/>
-                </a:schemeClr>
-              </a:buClr>
-              <a:buFont typeface="Wingdings 3" pitchFamily="18" charset="2"/>
-              <a:buChar char=""/>
-              <a:defRPr sz="2400" kern="1200">
-                <a:solidFill>
-                  <a:schemeClr val="tx1"/>
-                </a:solidFill>
-                <a:latin typeface="Open Sans" pitchFamily="2" charset="0"/>
-                <a:ea typeface="Open Sans" pitchFamily="2" charset="0"/>
-                <a:cs typeface="Open Sans" pitchFamily="2" charset="0"/>
-              </a:defRPr>
-            </a:lvl2pPr>
-            <a:lvl3pPr marL="1143000" indent="-228600" algn="l" defTabSz="914400" rtl="0" eaLnBrk="1" latinLnBrk="0" hangingPunct="1">
-              <a:spcBef>
-                <a:spcPct val="20000"/>
-              </a:spcBef>
-              <a:buClr>
-                <a:schemeClr val="accent1">
-                  <a:lumMod val="75000"/>
-                </a:schemeClr>
-              </a:buClr>
-              <a:buFont typeface="Arial" pitchFamily="34" charset="0"/>
-              <a:buChar char="•"/>
-              <a:defRPr sz="2000" kern="1200">
-                <a:solidFill>
-                  <a:schemeClr val="tx1"/>
-                </a:solidFill>
-                <a:latin typeface="Open Sans" pitchFamily="2" charset="0"/>
-                <a:ea typeface="Open Sans" pitchFamily="2" charset="0"/>
-                <a:cs typeface="Open Sans" pitchFamily="2" charset="0"/>
-              </a:defRPr>
-            </a:lvl3pPr>
-            <a:lvl4pPr marL="1600200" indent="-228600" algn="l" defTabSz="914400" rtl="0" eaLnBrk="1" latinLnBrk="0" hangingPunct="1">
-              <a:spcBef>
-                <a:spcPct val="20000"/>
-              </a:spcBef>
-              <a:buClr>
-                <a:schemeClr val="accent1">
-                  <a:lumMod val="75000"/>
-                </a:schemeClr>
-              </a:buClr>
-              <a:buFont typeface="Arial" pitchFamily="34" charset="0"/>
-              <a:buChar char="–"/>
-              <a:defRPr sz="1800" kern="1200">
-                <a:solidFill>
-                  <a:schemeClr val="tx1"/>
-                </a:solidFill>
-                <a:latin typeface="Open Sans" pitchFamily="2" charset="0"/>
-                <a:ea typeface="Open Sans" pitchFamily="2" charset="0"/>
-                <a:cs typeface="Open Sans" pitchFamily="2" charset="0"/>
-              </a:defRPr>
-            </a:lvl4pPr>
-            <a:lvl5pPr marL="2057400" indent="-228600" algn="l" defTabSz="914400" rtl="0" eaLnBrk="1" latinLnBrk="0" hangingPunct="1">
-              <a:spcBef>
-                <a:spcPct val="20000"/>
-              </a:spcBef>
-              <a:buClr>
-                <a:schemeClr val="accent1">
-                  <a:lumMod val="75000"/>
-                </a:schemeClr>
-              </a:buClr>
-              <a:buFont typeface="Arial" pitchFamily="34" charset="0"/>
-              <a:buChar char="»"/>
-              <a:defRPr sz="1800" kern="1200">
-                <a:solidFill>
-                  <a:schemeClr val="tx1"/>
-                </a:solidFill>
-                <a:latin typeface="Open Sans" pitchFamily="2" charset="0"/>
-                <a:ea typeface="Open Sans" pitchFamily="2" charset="0"/>
-                <a:cs typeface="Open Sans" pitchFamily="2" charset="0"/>
-              </a:defRPr>
-            </a:lvl5pPr>
-            <a:lvl6pPr marL="2514600" indent="-228600" algn="l" defTabSz="914400" rtl="0" eaLnBrk="1" latinLnBrk="0" hangingPunct="1">
-              <a:spcBef>
-                <a:spcPct val="20000"/>
-              </a:spcBef>
-              <a:buFont typeface="Arial" pitchFamily="34" charset="0"/>
-              <a:buChar char="•"/>
-              <a:defRPr sz="1800" kern="1200">
-                <a:solidFill>
-                  <a:schemeClr val="tx1"/>
-                </a:solidFill>
-                <a:latin typeface="+mn-lt"/>
-                <a:ea typeface="+mn-ea"/>
-                <a:cs typeface="+mn-cs"/>
-              </a:defRPr>
-            </a:lvl6pPr>
-            <a:lvl7pPr marL="2971800" indent="-228600" algn="l" defTabSz="914400" rtl="0" eaLnBrk="1" latinLnBrk="0" hangingPunct="1">
-              <a:spcBef>
-                <a:spcPct val="20000"/>
-              </a:spcBef>
-              <a:buFont typeface="Arial" pitchFamily="34" charset="0"/>
-              <a:buChar char="•"/>
-              <a:defRPr sz="1800" kern="1200">
-                <a:solidFill>
-                  <a:schemeClr val="tx1"/>
-                </a:solidFill>
-                <a:latin typeface="+mn-lt"/>
-                <a:ea typeface="+mn-ea"/>
-                <a:cs typeface="+mn-cs"/>
-              </a:defRPr>
-            </a:lvl7pPr>
-            <a:lvl8pPr marL="3429000" indent="-228600" algn="l" defTabSz="914400" rtl="0" eaLnBrk="1" latinLnBrk="0" hangingPunct="1">
-              <a:spcBef>
-                <a:spcPct val="20000"/>
-              </a:spcBef>
-              <a:buFont typeface="Arial" pitchFamily="34" charset="0"/>
-              <a:buChar char="•"/>
-              <a:defRPr sz="1800" kern="1200">
-                <a:solidFill>
-                  <a:schemeClr val="tx1"/>
-                </a:solidFill>
-                <a:latin typeface="+mn-lt"/>
-                <a:ea typeface="+mn-ea"/>
-                <a:cs typeface="+mn-cs"/>
-              </a:defRPr>
-            </a:lvl8pPr>
-            <a:lvl9pPr marL="3886200" indent="-228600" algn="l" defTabSz="914400" rtl="0" eaLnBrk="1" latinLnBrk="0" hangingPunct="1">
-              <a:spcBef>
-                <a:spcPct val="20000"/>
-              </a:spcBef>
-              <a:buFont typeface="Arial" pitchFamily="34" charset="0"/>
-              <a:buChar char="•"/>
-              <a:defRPr sz="1800" kern="1200">
-                <a:solidFill>
-                  <a:schemeClr val="tx1"/>
-                </a:solidFill>
-                <a:latin typeface="+mn-lt"/>
-                <a:ea typeface="+mn-ea"/>
-                <a:cs typeface="+mn-cs"/>
-              </a:defRPr>
-            </a:lvl9pPr>
-          </a:lstStyle>
-          <a:p>
-            <a:pPr marL="0" indent="0">
-              <a:spcBef>
-                <a:spcPts val="0"/>
-              </a:spcBef>
-              <a:buClrTx/>
-              <a:buSzTx/>
-              <a:buFontTx/>
-              <a:buNone/>
-              <a:defRPr/>
-            </a:pPr>
-            <a:r>
-              <a:rPr lang="fr-CH" sz="1000" dirty="0" err="1">
-                <a:solidFill>
-                  <a:prstClr val="black">
-                    <a:lumMod val="65000"/>
-                    <a:lumOff val="35000"/>
-                  </a:prstClr>
-                </a:solidFill>
-                <a:latin typeface="Open Sans Light" panose="020B0306030504020204" pitchFamily="34" charset="0"/>
-                <a:ea typeface="Open Sans Light" panose="020B0306030504020204" pitchFamily="34" charset="0"/>
-                <a:cs typeface="Open Sans Light" panose="020B0306030504020204" pitchFamily="34" charset="0"/>
-              </a:rPr>
-              <a:t>ProbStatIT</a:t>
-            </a:r>
-            <a:endParaRPr lang="fr-CH" sz="1000" dirty="0">
-              <a:solidFill>
-                <a:prstClr val="black">
-                  <a:lumMod val="65000"/>
-                  <a:lumOff val="35000"/>
-                </a:prstClr>
-              </a:solidFill>
-              <a:latin typeface="Open Sans Light" panose="020B0306030504020204" pitchFamily="34" charset="0"/>
-              <a:ea typeface="Open Sans Light" panose="020B0306030504020204" pitchFamily="34" charset="0"/>
-              <a:cs typeface="Open Sans Light" panose="020B0306030504020204" pitchFamily="34" charset="0"/>
-            </a:endParaRPr>
-          </a:p>
-        </p:txBody>
-      </p:sp>
-      <p:pic>
-        <p:nvPicPr>
-          <p:cNvPr id="5" name="Picture 4" descr="A black and white text&#10;&#10;AI-generated content may be incorrect.">
-            <a:extLst>
-              <a:ext uri="{FF2B5EF4-FFF2-40B4-BE49-F238E27FC236}">
-                <a16:creationId xmlns:a16="http://schemas.microsoft.com/office/drawing/2014/main" id="{FE09B1B8-6FFB-A484-2336-4F77640128B3}"/>
-              </a:ext>
-            </a:extLst>
-          </p:cNvPr>
-          <p:cNvPicPr>
-            <a:picLocks noChangeAspect="1"/>
-          </p:cNvPicPr>
-          <p:nvPr/>
-        </p:nvPicPr>
-        <p:blipFill>
-          <a:blip r:embed="rId3" cstate="print">
-            <a:extLst>
-              <a:ext uri="{28A0092B-C50C-407E-A947-70E740481C1C}">
-                <a14:useLocalDpi xmlns:a14="http://schemas.microsoft.com/office/drawing/2010/main" val="0"/>
-              </a:ext>
-            </a:extLst>
-          </a:blip>
-          <a:stretch>
-            <a:fillRect/>
-          </a:stretch>
-        </p:blipFill>
-        <p:spPr>
-          <a:xfrm>
-            <a:off x="7330021" y="204511"/>
-            <a:ext cx="4724015" cy="830816"/>
-          </a:xfrm>
-          <a:prstGeom prst="rect">
-            <a:avLst/>
-          </a:prstGeom>
-        </p:spPr>
-      </p:pic>
-    </p:spTree>
-    <p:extLst>
-      <p:ext uri="{BB962C8B-B14F-4D97-AF65-F5344CB8AC3E}">
-        <p14:creationId xmlns:p14="http://schemas.microsoft.com/office/powerpoint/2010/main" val="2637716327"/>
-      </p:ext>
-    </p:extLst>
-  </p:cSld>
-  <p:clrMapOvr>
-    <a:masterClrMapping/>
-  </p:clrMapOvr>
-  <mc:AlternateContent xmlns:mc="http://schemas.openxmlformats.org/markup-compatibility/2006" xmlns:p14="http://schemas.microsoft.com/office/powerpoint/2010/main">
-    <mc:Choice Requires="p14">
-      <p:transition p14:dur="0"/>
-    </mc:Choice>
-    <mc:Fallback xmlns="">
-      <p:transition/>
-    </mc:Fallback>
-  </mc:AlternateContent>
-</p:sld>
-</file>
-
-<file path=ppt/slides/slide3.xml><?xml version="1.0" encoding="utf-8"?>
-<p:sld xmlns:a="http://schemas.openxmlformats.org/drawingml/2006/main" xmlns:r="http://schemas.openxmlformats.org/officeDocument/2006/relationships" xmlns:p="http://schemas.openxmlformats.org/presentationml/2006/main">
-  <p:cSld>
-    <p:spTree>
-      <p:nvGrpSpPr>
-        <p:cNvPr id="1" name="">
-          <a:extLst>
-            <a:ext uri="{FF2B5EF4-FFF2-40B4-BE49-F238E27FC236}">
               <a16:creationId xmlns:a16="http://schemas.microsoft.com/office/drawing/2014/main" id="{DDCFBABE-983E-B7D5-3526-52EE648429B6}"/>
             </a:ext>
           </a:extLst>
@@ -10420,7 +10566,7 @@
             </a:r>
             <a:r>
               <a:rPr lang="fr-CH" sz="2000" b="1" dirty="0" err="1"/>
-              <a:t>Lgrangian</a:t>
+              <a:t>Lagrangian</a:t>
             </a:r>
             <a:r>
               <a:rPr lang="fr-CH" sz="2000" b="1" dirty="0"/>
@@ -10451,22 +10597,15 @@
               <a:buChar char="-"/>
             </a:pPr>
             <a:r>
-              <a:rPr lang="fr-CH" sz="1600" b="1" dirty="0"/>
+              <a:rPr lang="fr-CH" sz="2000" b="1" dirty="0"/>
               <a:t>Petits changements d’angles ou de vélocités</a:t>
             </a:r>
-          </a:p>
-          <a:p>
-            <a:pPr lvl="1">
-              <a:buClr>
-                <a:schemeClr val="accent2"/>
-              </a:buClr>
-              <a:buSzPct val="100000"/>
-              <a:buFontTx/>
-              <a:buChar char="-"/>
-            </a:pPr>
+            <a:br>
+              <a:rPr lang="fr-CH" sz="2000" b="1" dirty="0"/>
+            </a:br>
             <a:r>
-              <a:rPr lang="fr-CH" sz="1600" b="1" dirty="0"/>
-              <a:t>Provoquent des modifications simple à complexe et chaotique</a:t>
+              <a:rPr lang="fr-CH" sz="2000" b="1" dirty="0"/>
+              <a:t>donnent des trajectoires très différentes</a:t>
             </a:r>
           </a:p>
           <a:p>
@@ -10486,7 +10625,7 @@
             </a:r>
           </a:p>
           <a:p>
-            <a:pPr>
+            <a:pPr lvl="1">
               <a:buClr>
                 <a:schemeClr val="accent2"/>
               </a:buClr>
@@ -10494,7 +10633,10 @@
               <a:buFont typeface="Wingdings" panose="05000000000000000000" pitchFamily="2" charset="2"/>
               <a:buChar char="à"/>
             </a:pPr>
-            <a:endParaRPr lang="fr-CH" sz="2000" b="1" dirty="0"/>
+            <a:r>
+              <a:rPr lang="fr-CH" sz="2000" b="1" dirty="0"/>
+              <a:t>Régi par des lois exactes mais évolution imprévisible à long terme</a:t>
+            </a:r>
           </a:p>
         </p:txBody>
       </p:sp>
@@ -10522,7 +10664,7 @@
             <a:fld id="{23C040C7-4060-4381-887A-2EF827EF70EC}" type="slidenum">
               <a:rPr lang="fr-CH" smtClean="0"/>
               <a:pPr/>
-              <a:t>3</a:t>
+              <a:t>2</a:t>
             </a:fld>
             <a:endParaRPr lang="fr-CH"/>
           </a:p>
@@ -10793,423 +10935,12 @@
           </a:prstGeom>
         </p:spPr>
       </p:pic>
-    </p:spTree>
-    <p:extLst>
-      <p:ext uri="{BB962C8B-B14F-4D97-AF65-F5344CB8AC3E}">
-        <p14:creationId xmlns:p14="http://schemas.microsoft.com/office/powerpoint/2010/main" val="701930509"/>
-      </p:ext>
-    </p:extLst>
-  </p:cSld>
-  <p:clrMapOvr>
-    <a:masterClrMapping/>
-  </p:clrMapOvr>
-  <mc:AlternateContent xmlns:mc="http://schemas.openxmlformats.org/markup-compatibility/2006">
-    <mc:Choice xmlns:p14="http://schemas.microsoft.com/office/powerpoint/2010/main" Requires="p14">
-      <p:transition p14:dur="10"/>
-    </mc:Choice>
-    <mc:Fallback>
-      <p:transition/>
-    </mc:Fallback>
-  </mc:AlternateContent>
-</p:sld>
-</file>
-
-<file path=ppt/slides/slide4.xml><?xml version="1.0" encoding="utf-8"?>
-<p:sld xmlns:a="http://schemas.openxmlformats.org/drawingml/2006/main" xmlns:r="http://schemas.openxmlformats.org/officeDocument/2006/relationships" xmlns:p="http://schemas.openxmlformats.org/presentationml/2006/main">
-  <p:cSld>
-    <p:spTree>
-      <p:nvGrpSpPr>
-        <p:cNvPr id="1" name="">
-          <a:extLst>
-            <a:ext uri="{FF2B5EF4-FFF2-40B4-BE49-F238E27FC236}">
-              <a16:creationId xmlns:a16="http://schemas.microsoft.com/office/drawing/2014/main" id="{62E95CE9-5C79-9F9E-B7B7-A2DC5A47C0EC}"/>
-            </a:ext>
-          </a:extLst>
-        </p:cNvPr>
-        <p:cNvGrpSpPr/>
-        <p:nvPr/>
-      </p:nvGrpSpPr>
-      <p:grpSpPr>
-        <a:xfrm>
-          <a:off x="0" y="0"/>
-          <a:ext cx="0" cy="0"/>
-          <a:chOff x="0" y="0"/>
-          <a:chExt cx="0" cy="0"/>
-        </a:xfrm>
-      </p:grpSpPr>
-      <p:sp>
-        <p:nvSpPr>
-          <p:cNvPr id="2" name="Title 1">
+      <p:pic>
+        <p:nvPicPr>
+          <p:cNvPr id="8" name="Picture 7">
             <a:extLst>
               <a:ext uri="{FF2B5EF4-FFF2-40B4-BE49-F238E27FC236}">
-                <a16:creationId xmlns:a16="http://schemas.microsoft.com/office/drawing/2014/main" id="{BE09F03F-D1AC-0283-B069-583F395219CE}"/>
-              </a:ext>
-            </a:extLst>
-          </p:cNvPr>
-          <p:cNvSpPr>
-            <a:spLocks noGrp="1"/>
-          </p:cNvSpPr>
-          <p:nvPr>
-            <p:ph type="title"/>
-          </p:nvPr>
-        </p:nvSpPr>
-        <p:spPr/>
-        <p:txBody>
-          <a:bodyPr/>
-          <a:lstStyle/>
-          <a:p>
-            <a:r>
-              <a:rPr lang="fr-CH" dirty="0">
-                <a:solidFill>
-                  <a:srgbClr val="215968"/>
-                </a:solidFill>
-              </a:rPr>
-              <a:t>Formules</a:t>
-            </a:r>
-            <a:endParaRPr lang="en-US" dirty="0">
-              <a:solidFill>
-                <a:srgbClr val="215968"/>
-              </a:solidFill>
-            </a:endParaRPr>
-          </a:p>
-        </p:txBody>
-      </p:sp>
-      <p:sp>
-        <p:nvSpPr>
-          <p:cNvPr id="3" name="Content Placeholder 2">
-            <a:extLst>
-              <a:ext uri="{FF2B5EF4-FFF2-40B4-BE49-F238E27FC236}">
-                <a16:creationId xmlns:a16="http://schemas.microsoft.com/office/drawing/2014/main" id="{1339C18A-3DF0-99DE-27F5-E62A5E9AEA9B}"/>
-              </a:ext>
-            </a:extLst>
-          </p:cNvPr>
-          <p:cNvSpPr>
-            <a:spLocks noGrp="1"/>
-          </p:cNvSpPr>
-          <p:nvPr>
-            <p:ph sz="half" idx="1"/>
-          </p:nvPr>
-        </p:nvSpPr>
-        <p:spPr>
-          <a:xfrm>
-            <a:off x="497570" y="1393312"/>
-            <a:ext cx="11143046" cy="4916008"/>
-          </a:xfrm>
-        </p:spPr>
-        <p:txBody>
-          <a:bodyPr>
-            <a:normAutofit/>
-          </a:bodyPr>
-          <a:lstStyle/>
-          <a:p>
-            <a:pPr>
-              <a:buClr>
-                <a:schemeClr val="accent2"/>
-              </a:buClr>
-              <a:buSzPct val="100000"/>
-              <a:buFontTx/>
-              <a:buChar char="-"/>
-            </a:pPr>
-            <a:r>
-              <a:rPr lang="fr-CH" sz="1600" b="1" dirty="0"/>
-              <a:t>Equation de Lagrange</a:t>
-            </a:r>
-          </a:p>
-          <a:p>
-            <a:pPr>
-              <a:buClr>
-                <a:schemeClr val="accent2"/>
-              </a:buClr>
-              <a:buSzPct val="100000"/>
-              <a:buFontTx/>
-              <a:buChar char="-"/>
-            </a:pPr>
-            <a:r>
-              <a:rPr lang="fr-CH" sz="1600" b="1" dirty="0"/>
-              <a:t>Equation de mouvement</a:t>
-            </a:r>
-          </a:p>
-          <a:p>
-            <a:pPr>
-              <a:buClr>
-                <a:schemeClr val="accent2"/>
-              </a:buClr>
-              <a:buSzPct val="100000"/>
-              <a:buFontTx/>
-              <a:buChar char="-"/>
-            </a:pPr>
-            <a:r>
-              <a:rPr lang="fr-CH" sz="1600" b="1" dirty="0"/>
-              <a:t>Energies</a:t>
-            </a:r>
-          </a:p>
-        </p:txBody>
-      </p:sp>
-      <p:sp>
-        <p:nvSpPr>
-          <p:cNvPr id="7" name="Slide Number Placeholder 6">
-            <a:extLst>
-              <a:ext uri="{FF2B5EF4-FFF2-40B4-BE49-F238E27FC236}">
-                <a16:creationId xmlns:a16="http://schemas.microsoft.com/office/drawing/2014/main" id="{61643506-A7DC-7496-338D-F650DE0302E5}"/>
-              </a:ext>
-            </a:extLst>
-          </p:cNvPr>
-          <p:cNvSpPr>
-            <a:spLocks noGrp="1"/>
-          </p:cNvSpPr>
-          <p:nvPr>
-            <p:ph type="sldNum" sz="quarter" idx="4"/>
-          </p:nvPr>
-        </p:nvSpPr>
-        <p:spPr/>
-        <p:txBody>
-          <a:bodyPr/>
-          <a:lstStyle/>
-          <a:p>
-            <a:fld id="{23C040C7-4060-4381-887A-2EF827EF70EC}" type="slidenum">
-              <a:rPr lang="fr-CH" smtClean="0"/>
-              <a:pPr/>
-              <a:t>4</a:t>
-            </a:fld>
-            <a:endParaRPr lang="fr-CH"/>
-          </a:p>
-        </p:txBody>
-      </p:sp>
-      <p:sp>
-        <p:nvSpPr>
-          <p:cNvPr id="4" name="Date Placeholder 3">
-            <a:extLst>
-              <a:ext uri="{FF2B5EF4-FFF2-40B4-BE49-F238E27FC236}">
-                <a16:creationId xmlns:a16="http://schemas.microsoft.com/office/drawing/2014/main" id="{74F37848-B39A-9E67-2C21-2C681579DD52}"/>
-              </a:ext>
-            </a:extLst>
-          </p:cNvPr>
-          <p:cNvSpPr txBox="1">
-            <a:spLocks/>
-          </p:cNvSpPr>
-          <p:nvPr/>
-        </p:nvSpPr>
-        <p:spPr>
-          <a:xfrm>
-            <a:off x="241003" y="6520260"/>
-            <a:ext cx="2844800" cy="221109"/>
-          </a:xfrm>
-          <a:prstGeom prst="rect">
-            <a:avLst/>
-          </a:prstGeom>
-        </p:spPr>
-        <p:txBody>
-          <a:bodyPr vert="horz" lIns="91440" tIns="45720" rIns="91440" bIns="45720" rtlCol="0" anchor="ctr">
-            <a:normAutofit fontScale="92500" lnSpcReduction="10000"/>
-          </a:bodyPr>
-          <a:lstStyle>
-            <a:lvl1pPr marL="342900" indent="-342900" algn="l" defTabSz="914400" rtl="0" eaLnBrk="1" latinLnBrk="0" hangingPunct="1">
-              <a:spcBef>
-                <a:spcPct val="20000"/>
-              </a:spcBef>
-              <a:buClr>
-                <a:schemeClr val="accent1">
-                  <a:lumMod val="75000"/>
-                </a:schemeClr>
-              </a:buClr>
-              <a:buSzPct val="50000"/>
-              <a:buFont typeface="Inter Light" panose="02000503000000020004" pitchFamily="2" charset="0"/>
-              <a:buChar char="►"/>
-              <a:defRPr sz="2800" kern="1200">
-                <a:solidFill>
-                  <a:schemeClr val="tx1"/>
-                </a:solidFill>
-                <a:latin typeface="Open Sans" pitchFamily="2" charset="0"/>
-                <a:ea typeface="Open Sans" pitchFamily="2" charset="0"/>
-                <a:cs typeface="Open Sans" pitchFamily="2" charset="0"/>
-              </a:defRPr>
-            </a:lvl1pPr>
-            <a:lvl2pPr marL="742950" indent="-285750" algn="l" defTabSz="914400" rtl="0" eaLnBrk="1" latinLnBrk="0" hangingPunct="1">
-              <a:spcBef>
-                <a:spcPct val="20000"/>
-              </a:spcBef>
-              <a:buClr>
-                <a:schemeClr val="accent1">
-                  <a:lumMod val="75000"/>
-                </a:schemeClr>
-              </a:buClr>
-              <a:buFont typeface="Wingdings 3" pitchFamily="18" charset="2"/>
-              <a:buChar char=""/>
-              <a:defRPr sz="2400" kern="1200">
-                <a:solidFill>
-                  <a:schemeClr val="tx1"/>
-                </a:solidFill>
-                <a:latin typeface="Open Sans" pitchFamily="2" charset="0"/>
-                <a:ea typeface="Open Sans" pitchFamily="2" charset="0"/>
-                <a:cs typeface="Open Sans" pitchFamily="2" charset="0"/>
-              </a:defRPr>
-            </a:lvl2pPr>
-            <a:lvl3pPr marL="1143000" indent="-228600" algn="l" defTabSz="914400" rtl="0" eaLnBrk="1" latinLnBrk="0" hangingPunct="1">
-              <a:spcBef>
-                <a:spcPct val="20000"/>
-              </a:spcBef>
-              <a:buClr>
-                <a:schemeClr val="accent1">
-                  <a:lumMod val="75000"/>
-                </a:schemeClr>
-              </a:buClr>
-              <a:buFont typeface="Arial" pitchFamily="34" charset="0"/>
-              <a:buChar char="•"/>
-              <a:defRPr sz="2000" kern="1200">
-                <a:solidFill>
-                  <a:schemeClr val="tx1"/>
-                </a:solidFill>
-                <a:latin typeface="Open Sans" pitchFamily="2" charset="0"/>
-                <a:ea typeface="Open Sans" pitchFamily="2" charset="0"/>
-                <a:cs typeface="Open Sans" pitchFamily="2" charset="0"/>
-              </a:defRPr>
-            </a:lvl3pPr>
-            <a:lvl4pPr marL="1600200" indent="-228600" algn="l" defTabSz="914400" rtl="0" eaLnBrk="1" latinLnBrk="0" hangingPunct="1">
-              <a:spcBef>
-                <a:spcPct val="20000"/>
-              </a:spcBef>
-              <a:buClr>
-                <a:schemeClr val="accent1">
-                  <a:lumMod val="75000"/>
-                </a:schemeClr>
-              </a:buClr>
-              <a:buFont typeface="Arial" pitchFamily="34" charset="0"/>
-              <a:buChar char="–"/>
-              <a:defRPr sz="1800" kern="1200">
-                <a:solidFill>
-                  <a:schemeClr val="tx1"/>
-                </a:solidFill>
-                <a:latin typeface="Open Sans" pitchFamily="2" charset="0"/>
-                <a:ea typeface="Open Sans" pitchFamily="2" charset="0"/>
-                <a:cs typeface="Open Sans" pitchFamily="2" charset="0"/>
-              </a:defRPr>
-            </a:lvl4pPr>
-            <a:lvl5pPr marL="2057400" indent="-228600" algn="l" defTabSz="914400" rtl="0" eaLnBrk="1" latinLnBrk="0" hangingPunct="1">
-              <a:spcBef>
-                <a:spcPct val="20000"/>
-              </a:spcBef>
-              <a:buClr>
-                <a:schemeClr val="accent1">
-                  <a:lumMod val="75000"/>
-                </a:schemeClr>
-              </a:buClr>
-              <a:buFont typeface="Arial" pitchFamily="34" charset="0"/>
-              <a:buChar char="»"/>
-              <a:defRPr sz="1800" kern="1200">
-                <a:solidFill>
-                  <a:schemeClr val="tx1"/>
-                </a:solidFill>
-                <a:latin typeface="Open Sans" pitchFamily="2" charset="0"/>
-                <a:ea typeface="Open Sans" pitchFamily="2" charset="0"/>
-                <a:cs typeface="Open Sans" pitchFamily="2" charset="0"/>
-              </a:defRPr>
-            </a:lvl5pPr>
-            <a:lvl6pPr marL="2514600" indent="-228600" algn="l" defTabSz="914400" rtl="0" eaLnBrk="1" latinLnBrk="0" hangingPunct="1">
-              <a:spcBef>
-                <a:spcPct val="20000"/>
-              </a:spcBef>
-              <a:buFont typeface="Arial" pitchFamily="34" charset="0"/>
-              <a:buChar char="•"/>
-              <a:defRPr sz="1800" kern="1200">
-                <a:solidFill>
-                  <a:schemeClr val="tx1"/>
-                </a:solidFill>
-                <a:latin typeface="+mn-lt"/>
-                <a:ea typeface="+mn-ea"/>
-                <a:cs typeface="+mn-cs"/>
-              </a:defRPr>
-            </a:lvl6pPr>
-            <a:lvl7pPr marL="2971800" indent="-228600" algn="l" defTabSz="914400" rtl="0" eaLnBrk="1" latinLnBrk="0" hangingPunct="1">
-              <a:spcBef>
-                <a:spcPct val="20000"/>
-              </a:spcBef>
-              <a:buFont typeface="Arial" pitchFamily="34" charset="0"/>
-              <a:buChar char="•"/>
-              <a:defRPr sz="1800" kern="1200">
-                <a:solidFill>
-                  <a:schemeClr val="tx1"/>
-                </a:solidFill>
-                <a:latin typeface="+mn-lt"/>
-                <a:ea typeface="+mn-ea"/>
-                <a:cs typeface="+mn-cs"/>
-              </a:defRPr>
-            </a:lvl7pPr>
-            <a:lvl8pPr marL="3429000" indent="-228600" algn="l" defTabSz="914400" rtl="0" eaLnBrk="1" latinLnBrk="0" hangingPunct="1">
-              <a:spcBef>
-                <a:spcPct val="20000"/>
-              </a:spcBef>
-              <a:buFont typeface="Arial" pitchFamily="34" charset="0"/>
-              <a:buChar char="•"/>
-              <a:defRPr sz="1800" kern="1200">
-                <a:solidFill>
-                  <a:schemeClr val="tx1"/>
-                </a:solidFill>
-                <a:latin typeface="+mn-lt"/>
-                <a:ea typeface="+mn-ea"/>
-                <a:cs typeface="+mn-cs"/>
-              </a:defRPr>
-            </a:lvl8pPr>
-            <a:lvl9pPr marL="3886200" indent="-228600" algn="l" defTabSz="914400" rtl="0" eaLnBrk="1" latinLnBrk="0" hangingPunct="1">
-              <a:spcBef>
-                <a:spcPct val="20000"/>
-              </a:spcBef>
-              <a:buFont typeface="Arial" pitchFamily="34" charset="0"/>
-              <a:buChar char="•"/>
-              <a:defRPr sz="1800" kern="1200">
-                <a:solidFill>
-                  <a:schemeClr val="tx1"/>
-                </a:solidFill>
-                <a:latin typeface="+mn-lt"/>
-                <a:ea typeface="+mn-ea"/>
-                <a:cs typeface="+mn-cs"/>
-              </a:defRPr>
-            </a:lvl9pPr>
-          </a:lstStyle>
-          <a:p>
-            <a:pPr marL="0" indent="0">
-              <a:spcBef>
-                <a:spcPts val="0"/>
-              </a:spcBef>
-              <a:buClrTx/>
-              <a:buSzTx/>
-              <a:buFontTx/>
-              <a:buNone/>
-              <a:defRPr/>
-            </a:pPr>
-            <a:r>
-              <a:rPr lang="fr-CH" sz="1000" dirty="0" err="1">
-                <a:solidFill>
-                  <a:prstClr val="black">
-                    <a:lumMod val="65000"/>
-                    <a:lumOff val="35000"/>
-                  </a:prstClr>
-                </a:solidFill>
-                <a:latin typeface="Open Sans Light" panose="020B0306030504020204" pitchFamily="34" charset="0"/>
-                <a:ea typeface="Open Sans Light" panose="020B0306030504020204" pitchFamily="34" charset="0"/>
-                <a:cs typeface="Open Sans Light" panose="020B0306030504020204" pitchFamily="34" charset="0"/>
-              </a:rPr>
-              <a:t>ProbStatIT</a:t>
-            </a:r>
-            <a:endParaRPr lang="fr-CH" sz="1000" dirty="0">
-              <a:solidFill>
-                <a:prstClr val="black">
-                  <a:lumMod val="65000"/>
-                  <a:lumOff val="35000"/>
-                </a:prstClr>
-              </a:solidFill>
-              <a:latin typeface="Open Sans Light" panose="020B0306030504020204" pitchFamily="34" charset="0"/>
-              <a:ea typeface="Open Sans Light" panose="020B0306030504020204" pitchFamily="34" charset="0"/>
-              <a:cs typeface="Open Sans Light" panose="020B0306030504020204" pitchFamily="34" charset="0"/>
-            </a:endParaRPr>
-          </a:p>
-        </p:txBody>
-      </p:sp>
-      <p:pic>
-        <p:nvPicPr>
-          <p:cNvPr id="5" name="Picture 4" descr="A black and white text&#10;&#10;AI-generated content may be incorrect.">
-            <a:extLst>
-              <a:ext uri="{FF2B5EF4-FFF2-40B4-BE49-F238E27FC236}">
-                <a16:creationId xmlns:a16="http://schemas.microsoft.com/office/drawing/2014/main" id="{37F24F12-CD9A-91A4-C986-DE8C8C9E0F76}"/>
+                <a16:creationId xmlns:a16="http://schemas.microsoft.com/office/drawing/2014/main" id="{7796F97D-D0C8-05E0-0D17-6A858C525A6F}"/>
               </a:ext>
             </a:extLst>
           </p:cNvPr>
@@ -11219,7 +10950,7 @@
           <p:nvPr/>
         </p:nvPicPr>
         <p:blipFill>
-          <a:blip r:embed="rId3" cstate="print">
+          <a:blip r:embed="rId4">
             <a:extLst>
               <a:ext uri="{28A0092B-C50C-407E-A947-70E740481C1C}">
                 <a14:useLocalDpi xmlns:a14="http://schemas.microsoft.com/office/drawing/2010/main" val="0"/>
@@ -11232,8 +10963,8 @@
         </p:blipFill>
         <p:spPr>
           <a:xfrm>
-            <a:off x="7330021" y="204511"/>
-            <a:ext cx="4724015" cy="830816"/>
+            <a:off x="3441975" y="0"/>
+            <a:ext cx="5308050" cy="6858000"/>
           </a:xfrm>
           <a:prstGeom prst="rect">
             <a:avLst/>
@@ -11243,25 +10974,100 @@
     </p:spTree>
     <p:extLst>
       <p:ext uri="{BB962C8B-B14F-4D97-AF65-F5344CB8AC3E}">
-        <p14:creationId xmlns:p14="http://schemas.microsoft.com/office/powerpoint/2010/main" val="471394660"/>
+        <p14:creationId xmlns:p14="http://schemas.microsoft.com/office/powerpoint/2010/main" val="701930509"/>
       </p:ext>
     </p:extLst>
   </p:cSld>
   <p:clrMapOvr>
     <a:masterClrMapping/>
   </p:clrMapOvr>
-  <mc:AlternateContent xmlns:mc="http://schemas.openxmlformats.org/markup-compatibility/2006">
-    <mc:Choice xmlns:p14="http://schemas.microsoft.com/office/powerpoint/2010/main" Requires="p14">
-      <p:transition p14:dur="0"/>
+  <mc:AlternateContent xmlns:mc="http://schemas.openxmlformats.org/markup-compatibility/2006" xmlns:p14="http://schemas.microsoft.com/office/powerpoint/2010/main">
+    <mc:Choice Requires="p14">
+      <p:transition p14:dur="10"/>
     </mc:Choice>
-    <mc:Fallback>
+    <mc:Fallback xmlns="">
       <p:transition/>
     </mc:Fallback>
   </mc:AlternateContent>
+  <p:timing>
+    <p:tnLst>
+      <p:par>
+        <p:cTn id="1" dur="indefinite" restart="never" nodeType="tmRoot">
+          <p:childTnLst>
+            <p:seq concurrent="1" nextAc="seek">
+              <p:cTn id="2" dur="indefinite" nodeType="mainSeq">
+                <p:childTnLst>
+                  <p:par>
+                    <p:cTn id="3" fill="hold">
+                      <p:stCondLst>
+                        <p:cond delay="indefinite"/>
+                      </p:stCondLst>
+                      <p:childTnLst>
+                        <p:par>
+                          <p:cTn id="4" fill="hold">
+                            <p:stCondLst>
+                              <p:cond delay="0"/>
+                            </p:stCondLst>
+                            <p:childTnLst>
+                              <p:par>
+                                <p:cTn id="5" presetID="1" presetClass="entr" presetSubtype="0" fill="hold" nodeType="clickEffect">
+                                  <p:stCondLst>
+                                    <p:cond delay="0"/>
+                                  </p:stCondLst>
+                                  <p:childTnLst>
+                                    <p:set>
+                                      <p:cBhvr>
+                                        <p:cTn id="6" dur="1" fill="hold">
+                                          <p:stCondLst>
+                                            <p:cond delay="0"/>
+                                          </p:stCondLst>
+                                        </p:cTn>
+                                        <p:tgtEl>
+                                          <p:spTgt spid="8"/>
+                                        </p:tgtEl>
+                                        <p:attrNameLst>
+                                          <p:attrName>style.visibility</p:attrName>
+                                        </p:attrNameLst>
+                                      </p:cBhvr>
+                                      <p:to>
+                                        <p:strVal val="visible"/>
+                                      </p:to>
+                                    </p:set>
+                                  </p:childTnLst>
+                                </p:cTn>
+                              </p:par>
+                            </p:childTnLst>
+                          </p:cTn>
+                        </p:par>
+                      </p:childTnLst>
+                    </p:cTn>
+                  </p:par>
+                </p:childTnLst>
+              </p:cTn>
+              <p:prevCondLst>
+                <p:cond evt="onPrev" delay="0">
+                  <p:tgtEl>
+                    <p:sldTgt/>
+                  </p:tgtEl>
+                </p:cond>
+              </p:prevCondLst>
+              <p:nextCondLst>
+                <p:cond evt="onNext" delay="0">
+                  <p:tgtEl>
+                    <p:sldTgt/>
+                  </p:tgtEl>
+                </p:cond>
+              </p:nextCondLst>
+            </p:seq>
+          </p:childTnLst>
+        </p:cTn>
+      </p:par>
+    </p:tnLst>
+  </p:timing>
 </p:sld>
 </file>
 
-<file path=ppt/slides/slide5.xml><?xml version="1.0" encoding="utf-8"?>
+<file path=ppt/slides/slide3.xml><?xml version="1.0" encoding="utf-8"?>
 <p:sld xmlns:a="http://schemas.openxmlformats.org/drawingml/2006/main" xmlns:r="http://schemas.openxmlformats.org/officeDocument/2006/relationships" xmlns:p="http://schemas.openxmlformats.org/presentationml/2006/main">
   <p:cSld>
     <p:spTree>
@@ -11321,99 +11127,191 @@
           </a:p>
         </p:txBody>
       </p:sp>
-      <p:sp>
-        <p:nvSpPr>
-          <p:cNvPr id="3" name="Content Placeholder 2">
-            <a:extLst>
-              <a:ext uri="{FF2B5EF4-FFF2-40B4-BE49-F238E27FC236}">
-                <a16:creationId xmlns:a16="http://schemas.microsoft.com/office/drawing/2014/main" id="{06456E7E-7A52-6A52-5FC2-509068721B3D}"/>
-              </a:ext>
-            </a:extLst>
-          </p:cNvPr>
-          <p:cNvSpPr>
-            <a:spLocks noGrp="1"/>
-          </p:cNvSpPr>
-          <p:nvPr>
-            <p:ph sz="half" idx="1"/>
-          </p:nvPr>
-        </p:nvSpPr>
-        <p:spPr>
-          <a:xfrm>
-            <a:off x="497570" y="1393312"/>
-            <a:ext cx="11143046" cy="4916008"/>
-          </a:xfrm>
-        </p:spPr>
-        <p:txBody>
-          <a:bodyPr>
-            <a:normAutofit/>
-          </a:bodyPr>
-          <a:lstStyle/>
-          <a:p>
-            <a:pPr>
-              <a:buClr>
-                <a:schemeClr val="accent2"/>
-              </a:buClr>
-              <a:buSzPct val="100000"/>
-              <a:buFontTx/>
-              <a:buChar char="-"/>
-            </a:pPr>
-            <a:r>
-              <a:rPr lang="fr-CH" sz="1600" b="1" dirty="0"/>
-              <a:t>Reformulation des lois de Newton</a:t>
-            </a:r>
-          </a:p>
-          <a:p>
-            <a:pPr>
-              <a:buClr>
-                <a:schemeClr val="accent2"/>
-              </a:buClr>
-              <a:buSzPct val="100000"/>
-              <a:buFontTx/>
-              <a:buChar char="-"/>
-            </a:pPr>
-            <a:r>
-              <a:rPr lang="fr-CH" sz="1600" b="1" dirty="0"/>
-              <a:t>Permet d’avoir facilement les équations du mouvement d’un système complexe sans prendre ne compte les forces</a:t>
-            </a:r>
-          </a:p>
-          <a:p>
-            <a:pPr>
-              <a:buClr>
-                <a:schemeClr val="accent2"/>
-              </a:buClr>
-              <a:buSzPct val="100000"/>
-              <a:buFontTx/>
-              <a:buChar char="-"/>
-            </a:pPr>
-            <a:r>
-              <a:rPr lang="fr-CH" sz="1600" b="1" dirty="0"/>
-              <a:t>Principe de moindre action utilisé avec Euler-Lagrange</a:t>
-            </a:r>
-          </a:p>
-          <a:p>
-            <a:pPr>
-              <a:buClr>
-                <a:schemeClr val="accent2"/>
-              </a:buClr>
-              <a:buSzPct val="100000"/>
-              <a:buFontTx/>
-              <a:buChar char="-"/>
-            </a:pPr>
-            <a:endParaRPr lang="fr-CH" sz="1200" b="1" dirty="0"/>
-          </a:p>
-          <a:p>
-            <a:pPr lvl="1">
-              <a:buClr>
-                <a:schemeClr val="accent2"/>
-              </a:buClr>
-              <a:buSzPct val="100000"/>
-              <a:buFontTx/>
-              <a:buChar char="-"/>
-            </a:pPr>
-            <a:endParaRPr lang="fr-CH" sz="1200" b="1" dirty="0"/>
-          </a:p>
-        </p:txBody>
-      </p:sp>
+      <mc:AlternateContent xmlns:mc="http://schemas.openxmlformats.org/markup-compatibility/2006">
+        <mc:Choice xmlns:a14="http://schemas.microsoft.com/office/drawing/2010/main" Requires="a14">
+          <p:sp>
+            <p:nvSpPr>
+              <p:cNvPr id="3" name="Content Placeholder 2">
+                <a:extLst>
+                  <a:ext uri="{FF2B5EF4-FFF2-40B4-BE49-F238E27FC236}">
+                    <a16:creationId xmlns:a16="http://schemas.microsoft.com/office/drawing/2014/main" id="{06456E7E-7A52-6A52-5FC2-509068721B3D}"/>
+                  </a:ext>
+                </a:extLst>
+              </p:cNvPr>
+              <p:cNvSpPr>
+                <a:spLocks noGrp="1"/>
+              </p:cNvSpPr>
+              <p:nvPr>
+                <p:ph sz="half" idx="1"/>
+              </p:nvPr>
+            </p:nvSpPr>
+            <p:spPr>
+              <a:xfrm>
+                <a:off x="497570" y="1393312"/>
+                <a:ext cx="11143046" cy="4916008"/>
+              </a:xfrm>
+            </p:spPr>
+            <p:txBody>
+              <a:bodyPr>
+                <a:normAutofit/>
+              </a:bodyPr>
+              <a:lstStyle/>
+              <a:p>
+                <a:pPr>
+                  <a:buClr>
+                    <a:schemeClr val="accent2"/>
+                  </a:buClr>
+                  <a:buSzPct val="100000"/>
+                  <a:buFontTx/>
+                  <a:buChar char="-"/>
+                </a:pPr>
+                <a:r>
+                  <a:rPr lang="fr-CH" sz="2000" b="1" dirty="0"/>
+                  <a:t>Reformulation des lois de Newton</a:t>
+                </a:r>
+              </a:p>
+              <a:p>
+                <a:pPr>
+                  <a:buClr>
+                    <a:schemeClr val="accent2"/>
+                  </a:buClr>
+                  <a:buSzPct val="100000"/>
+                  <a:buFontTx/>
+                  <a:buChar char="-"/>
+                </a:pPr>
+                <a:r>
+                  <a:rPr lang="fr-CH" sz="2000" b="1" dirty="0"/>
+                  <a:t>Permet d’avoir facilement les équations du mouvement d’un système complexe sans analyser chaque force séparément</a:t>
+                </a:r>
+              </a:p>
+              <a:p>
+                <a:pPr>
+                  <a:buClr>
+                    <a:schemeClr val="accent2"/>
+                  </a:buClr>
+                  <a:buSzPct val="100000"/>
+                  <a:buFontTx/>
+                  <a:buChar char="-"/>
+                </a:pPr>
+                <a:endParaRPr lang="fr-CH" sz="1200" b="1" dirty="0"/>
+              </a:p>
+              <a:p>
+                <a:pPr marL="0" indent="0">
+                  <a:buClr>
+                    <a:schemeClr val="accent2"/>
+                  </a:buClr>
+                  <a:buSzPct val="100000"/>
+                  <a:buNone/>
+                </a:pPr>
+                <a14:m>
+                  <m:oMathPara xmlns:m="http://schemas.openxmlformats.org/officeDocument/2006/math">
+                    <m:oMathParaPr>
+                      <m:jc m:val="center"/>
+                    </m:oMathParaPr>
+                    <m:oMath xmlns:m="http://schemas.openxmlformats.org/officeDocument/2006/math">
+                      <m:r>
+                        <a:rPr lang="en-GB" sz="3600" b="1" i="1" smtClean="0">
+                          <a:latin typeface="Cambria Math" panose="02040503050406030204" pitchFamily="18" charset="0"/>
+                        </a:rPr>
+                        <m:t>𝑳</m:t>
+                      </m:r>
+                      <m:r>
+                        <a:rPr lang="en-GB" sz="3600" b="1" i="1" smtClean="0">
+                          <a:latin typeface="Cambria Math" panose="02040503050406030204" pitchFamily="18" charset="0"/>
+                        </a:rPr>
+                        <m:t>=</m:t>
+                      </m:r>
+                      <m:r>
+                        <a:rPr lang="en-GB" sz="3600" b="1" i="1" smtClean="0">
+                          <a:latin typeface="Cambria Math" panose="02040503050406030204" pitchFamily="18" charset="0"/>
+                        </a:rPr>
+                        <m:t>𝑻</m:t>
+                      </m:r>
+                      <m:r>
+                        <a:rPr lang="en-GB" sz="3600" b="1" i="1" smtClean="0">
+                          <a:latin typeface="Cambria Math" panose="02040503050406030204" pitchFamily="18" charset="0"/>
+                        </a:rPr>
+                        <m:t>−</m:t>
+                      </m:r>
+                      <m:r>
+                        <a:rPr lang="en-GB" sz="3600" b="1" i="1" smtClean="0">
+                          <a:latin typeface="Cambria Math" panose="02040503050406030204" pitchFamily="18" charset="0"/>
+                        </a:rPr>
+                        <m:t>𝑽</m:t>
+                      </m:r>
+                    </m:oMath>
+                  </m:oMathPara>
+                </a14:m>
+                <a:endParaRPr lang="fr-CH" sz="3600" b="1" dirty="0"/>
+              </a:p>
+              <a:p>
+                <a:pPr marL="0" indent="0">
+                  <a:buClr>
+                    <a:schemeClr val="accent2"/>
+                  </a:buClr>
+                  <a:buSzPct val="100000"/>
+                  <a:buNone/>
+                </a:pPr>
+                <a:endParaRPr lang="fr-CH" sz="2000" b="1" dirty="0"/>
+              </a:p>
+              <a:p>
+                <a:pPr lvl="1">
+                  <a:buClr>
+                    <a:schemeClr val="accent2"/>
+                  </a:buClr>
+                  <a:buSzPct val="100000"/>
+                  <a:buFontTx/>
+                  <a:buChar char="-"/>
+                </a:pPr>
+                <a:endParaRPr lang="fr-CH" sz="1200" b="1" dirty="0"/>
+              </a:p>
+            </p:txBody>
+          </p:sp>
+        </mc:Choice>
+        <mc:Fallback>
+          <p:sp>
+            <p:nvSpPr>
+              <p:cNvPr id="3" name="Content Placeholder 2">
+                <a:extLst>
+                  <a:ext uri="{FF2B5EF4-FFF2-40B4-BE49-F238E27FC236}">
+                    <a16:creationId xmlns:a16="http://schemas.microsoft.com/office/drawing/2014/main" id="{06456E7E-7A52-6A52-5FC2-509068721B3D}"/>
+                  </a:ext>
+                </a:extLst>
+              </p:cNvPr>
+              <p:cNvSpPr>
+                <a:spLocks noGrp="1" noRot="1" noChangeAspect="1" noMove="1" noResize="1" noEditPoints="1" noAdjustHandles="1" noChangeArrowheads="1" noChangeShapeType="1" noTextEdit="1"/>
+              </p:cNvSpPr>
+              <p:nvPr>
+                <p:ph sz="half" idx="1"/>
+              </p:nvPr>
+            </p:nvSpPr>
+            <p:spPr>
+              <a:xfrm>
+                <a:off x="497570" y="1393312"/>
+                <a:ext cx="11143046" cy="4916008"/>
+              </a:xfrm>
+              <a:blipFill>
+                <a:blip r:embed="rId3"/>
+                <a:stretch>
+                  <a:fillRect l="-766"/>
+                </a:stretch>
+              </a:blipFill>
+            </p:spPr>
+            <p:txBody>
+              <a:bodyPr/>
+              <a:lstStyle/>
+              <a:p>
+                <a:r>
+                  <a:rPr lang="fr-CH">
+                    <a:noFill/>
+                  </a:rPr>
+                  <a:t> </a:t>
+                </a:r>
+              </a:p>
+            </p:txBody>
+          </p:sp>
+        </mc:Fallback>
+      </mc:AlternateContent>
       <p:sp>
         <p:nvSpPr>
           <p:cNvPr id="7" name="Slide Number Placeholder 6">
@@ -11438,7 +11336,7 @@
             <a:fld id="{23C040C7-4060-4381-887A-2EF827EF70EC}" type="slidenum">
               <a:rPr lang="fr-CH" smtClean="0"/>
               <a:pPr/>
-              <a:t>5</a:t>
+              <a:t>3</a:t>
             </a:fld>
             <a:endParaRPr lang="fr-CH"/>
           </a:p>
@@ -11688,7 +11586,7 @@
           <p:nvPr/>
         </p:nvPicPr>
         <p:blipFill>
-          <a:blip r:embed="rId3" cstate="print">
+          <a:blip r:embed="rId4" cstate="print">
             <a:extLst>
               <a:ext uri="{28A0092B-C50C-407E-A947-70E740481C1C}">
                 <a14:useLocalDpi xmlns:a14="http://schemas.microsoft.com/office/drawing/2010/main" val="0"/>
@@ -11719,18 +11617,100 @@
   <p:clrMapOvr>
     <a:masterClrMapping/>
   </p:clrMapOvr>
-  <mc:AlternateContent xmlns:mc="http://schemas.openxmlformats.org/markup-compatibility/2006">
-    <mc:Choice xmlns:p14="http://schemas.microsoft.com/office/powerpoint/2010/main" Requires="p14">
+  <mc:AlternateContent xmlns:mc="http://schemas.openxmlformats.org/markup-compatibility/2006" xmlns:p14="http://schemas.microsoft.com/office/powerpoint/2010/main">
+    <mc:Choice Requires="p14">
       <p:transition p14:dur="0"/>
     </mc:Choice>
-    <mc:Fallback>
+    <mc:Fallback xmlns="">
       <p:transition/>
     </mc:Fallback>
   </mc:AlternateContent>
+  <p:timing>
+    <p:tnLst>
+      <p:par>
+        <p:cTn id="1" dur="indefinite" restart="never" nodeType="tmRoot">
+          <p:childTnLst>
+            <p:seq concurrent="1" nextAc="seek">
+              <p:cTn id="2" dur="indefinite" nodeType="mainSeq">
+                <p:childTnLst>
+                  <p:par>
+                    <p:cTn id="3" fill="hold">
+                      <p:stCondLst>
+                        <p:cond delay="indefinite"/>
+                      </p:stCondLst>
+                      <p:childTnLst>
+                        <p:par>
+                          <p:cTn id="4" fill="hold">
+                            <p:stCondLst>
+                              <p:cond delay="0"/>
+                            </p:stCondLst>
+                            <p:childTnLst>
+                              <p:par>
+                                <p:cTn id="5" presetID="1" presetClass="entr" presetSubtype="0" fill="hold" grpId="0" nodeType="clickEffect">
+                                  <p:stCondLst>
+                                    <p:cond delay="0"/>
+                                  </p:stCondLst>
+                                  <p:childTnLst>
+                                    <p:set>
+                                      <p:cBhvr>
+                                        <p:cTn id="6" dur="1" fill="hold">
+                                          <p:stCondLst>
+                                            <p:cond delay="0"/>
+                                          </p:stCondLst>
+                                        </p:cTn>
+                                        <p:tgtEl>
+                                          <p:spTgt spid="3">
+                                            <p:txEl>
+                                              <p:pRg st="3" end="3"/>
+                                            </p:txEl>
+                                          </p:spTgt>
+                                        </p:tgtEl>
+                                        <p:attrNameLst>
+                                          <p:attrName>style.visibility</p:attrName>
+                                        </p:attrNameLst>
+                                      </p:cBhvr>
+                                      <p:to>
+                                        <p:strVal val="visible"/>
+                                      </p:to>
+                                    </p:set>
+                                  </p:childTnLst>
+                                </p:cTn>
+                              </p:par>
+                            </p:childTnLst>
+                          </p:cTn>
+                        </p:par>
+                      </p:childTnLst>
+                    </p:cTn>
+                  </p:par>
+                </p:childTnLst>
+              </p:cTn>
+              <p:prevCondLst>
+                <p:cond evt="onPrev" delay="0">
+                  <p:tgtEl>
+                    <p:sldTgt/>
+                  </p:tgtEl>
+                </p:cond>
+              </p:prevCondLst>
+              <p:nextCondLst>
+                <p:cond evt="onNext" delay="0">
+                  <p:tgtEl>
+                    <p:sldTgt/>
+                  </p:tgtEl>
+                </p:cond>
+              </p:nextCondLst>
+            </p:seq>
+          </p:childTnLst>
+        </p:cTn>
+      </p:par>
+    </p:tnLst>
+    <p:bldLst>
+      <p:bldP spid="3" grpId="0" uiExpand="1" build="p"/>
+    </p:bldLst>
+  </p:timing>
 </p:sld>
 </file>
 
-<file path=ppt/slides/slide6.xml><?xml version="1.0" encoding="utf-8"?>
+<file path=ppt/slides/slide4.xml><?xml version="1.0" encoding="utf-8"?>
 <p:sld xmlns:a="http://schemas.openxmlformats.org/drawingml/2006/main" xmlns:r="http://schemas.openxmlformats.org/officeDocument/2006/relationships" xmlns:p="http://schemas.openxmlformats.org/presentationml/2006/main">
   <p:cSld>
     <p:spTree>
@@ -11738,7 +11718,7 @@
         <p:cNvPr id="1" name="">
           <a:extLst>
             <a:ext uri="{FF2B5EF4-FFF2-40B4-BE49-F238E27FC236}">
-              <a16:creationId xmlns:a16="http://schemas.microsoft.com/office/drawing/2014/main" id="{88EB0B8A-9B5A-8893-F832-6665BBEAC62F}"/>
+              <a16:creationId xmlns:a16="http://schemas.microsoft.com/office/drawing/2014/main" id="{2084F294-5FF1-9831-8E67-F10DF4D6E241}"/>
             </a:ext>
           </a:extLst>
         </p:cNvPr>
@@ -11758,7 +11738,7 @@
           <p:cNvPr id="2" name="Title 1">
             <a:extLst>
               <a:ext uri="{FF2B5EF4-FFF2-40B4-BE49-F238E27FC236}">
-                <a16:creationId xmlns:a16="http://schemas.microsoft.com/office/drawing/2014/main" id="{2B12DBF4-6BD1-A37C-3E1D-274CDB663C9F}"/>
+                <a16:creationId xmlns:a16="http://schemas.microsoft.com/office/drawing/2014/main" id="{12C4A667-A634-46C8-E665-C82D29275521}"/>
               </a:ext>
             </a:extLst>
           </p:cNvPr>
@@ -11780,7 +11760,7 @@
                   <a:srgbClr val="215968"/>
                 </a:solidFill>
               </a:rPr>
-              <a:t>Equation du mouvement</a:t>
+              <a:t>Euler-Lagrange</a:t>
             </a:r>
             <a:endParaRPr lang="en-US" dirty="0">
               <a:solidFill>
@@ -11790,77 +11770,429 @@
           </a:p>
         </p:txBody>
       </p:sp>
-      <p:sp>
-        <p:nvSpPr>
-          <p:cNvPr id="3" name="Content Placeholder 2">
-            <a:extLst>
-              <a:ext uri="{FF2B5EF4-FFF2-40B4-BE49-F238E27FC236}">
-                <a16:creationId xmlns:a16="http://schemas.microsoft.com/office/drawing/2014/main" id="{A7EE84F3-4A46-E0F8-B1D6-853667EC49C9}"/>
-              </a:ext>
-            </a:extLst>
-          </p:cNvPr>
-          <p:cNvSpPr>
-            <a:spLocks noGrp="1"/>
-          </p:cNvSpPr>
-          <p:nvPr>
-            <p:ph sz="half" idx="1"/>
-          </p:nvPr>
-        </p:nvSpPr>
-        <p:spPr>
-          <a:xfrm>
-            <a:off x="497570" y="1393312"/>
-            <a:ext cx="11143046" cy="4916008"/>
-          </a:xfrm>
-        </p:spPr>
-        <p:txBody>
-          <a:bodyPr>
-            <a:normAutofit/>
-          </a:bodyPr>
-          <a:lstStyle/>
-          <a:p>
-            <a:pPr>
-              <a:buClr>
-                <a:schemeClr val="accent2"/>
-              </a:buClr>
-              <a:buSzPct val="100000"/>
-              <a:buFontTx/>
-              <a:buChar char="-"/>
-            </a:pPr>
-            <a:r>
-              <a:rPr lang="fr-CH" sz="1600" b="1" dirty="0"/>
-              <a:t>Principe de moindre action utilisé avec Euler-Lagrange</a:t>
-            </a:r>
-          </a:p>
-          <a:p>
-            <a:pPr>
-              <a:buClr>
-                <a:schemeClr val="accent2"/>
-              </a:buClr>
-              <a:buSzPct val="100000"/>
-              <a:buFontTx/>
-              <a:buChar char="-"/>
-            </a:pPr>
-            <a:endParaRPr lang="fr-CH" sz="1200" b="1" dirty="0"/>
-          </a:p>
-          <a:p>
-            <a:pPr lvl="1">
-              <a:buClr>
-                <a:schemeClr val="accent2"/>
-              </a:buClr>
-              <a:buSzPct val="100000"/>
-              <a:buFontTx/>
-              <a:buChar char="-"/>
-            </a:pPr>
-            <a:endParaRPr lang="fr-CH" sz="1200" b="1" dirty="0"/>
-          </a:p>
-        </p:txBody>
-      </p:sp>
+      <mc:AlternateContent xmlns:mc="http://schemas.openxmlformats.org/markup-compatibility/2006">
+        <mc:Choice xmlns:a14="http://schemas.microsoft.com/office/drawing/2010/main" Requires="a14">
+          <p:sp>
+            <p:nvSpPr>
+              <p:cNvPr id="3" name="Content Placeholder 2">
+                <a:extLst>
+                  <a:ext uri="{FF2B5EF4-FFF2-40B4-BE49-F238E27FC236}">
+                    <a16:creationId xmlns:a16="http://schemas.microsoft.com/office/drawing/2014/main" id="{7811A8F7-4C51-ACE8-141E-F08EC0C328C4}"/>
+                  </a:ext>
+                </a:extLst>
+              </p:cNvPr>
+              <p:cNvSpPr>
+                <a:spLocks noGrp="1"/>
+              </p:cNvSpPr>
+              <p:nvPr>
+                <p:ph sz="half" idx="1"/>
+              </p:nvPr>
+            </p:nvSpPr>
+            <p:spPr>
+              <a:xfrm>
+                <a:off x="497570" y="1393312"/>
+                <a:ext cx="11143046" cy="4916008"/>
+              </a:xfrm>
+            </p:spPr>
+            <p:txBody>
+              <a:bodyPr>
+                <a:normAutofit/>
+              </a:bodyPr>
+              <a:lstStyle/>
+              <a:p>
+                <a:pPr>
+                  <a:buClr>
+                    <a:schemeClr val="accent2"/>
+                  </a:buClr>
+                  <a:buSzPct val="100000"/>
+                  <a:buFontTx/>
+                  <a:buChar char="-"/>
+                </a:pPr>
+                <a:r>
+                  <a:rPr lang="en-GB" sz="2000" b="1" dirty="0"/>
+                  <a:t>Permet de determiner les </a:t>
+                </a:r>
+                <a:r>
+                  <a:rPr lang="en-GB" sz="2000" b="1" dirty="0" err="1"/>
+                  <a:t>équations</a:t>
+                </a:r>
+                <a:r>
+                  <a:rPr lang="en-GB" sz="2000" b="1" dirty="0"/>
+                  <a:t> de movement d’un </a:t>
+                </a:r>
+                <a:r>
+                  <a:rPr lang="en-GB" sz="2000" b="1" dirty="0" err="1"/>
+                  <a:t>système</a:t>
+                </a:r>
+                <a:r>
+                  <a:rPr lang="en-GB" sz="2000" b="1" dirty="0"/>
+                  <a:t> </a:t>
+                </a:r>
+                <a:r>
+                  <a:rPr lang="en-GB" sz="2000" b="1" dirty="0" err="1"/>
+                  <a:t>mécanique</a:t>
+                </a:r>
+                <a:endParaRPr lang="en-GB" sz="2000" b="1" dirty="0"/>
+              </a:p>
+              <a:p>
+                <a:pPr>
+                  <a:buClr>
+                    <a:schemeClr val="accent2"/>
+                  </a:buClr>
+                  <a:buSzPct val="100000"/>
+                  <a:buFontTx/>
+                  <a:buChar char="-"/>
+                </a:pPr>
+                <a:r>
+                  <a:rPr lang="en-GB" sz="2000" b="1" dirty="0"/>
+                  <a:t>Se base sur les </a:t>
+                </a:r>
+                <a:r>
+                  <a:rPr lang="en-GB" sz="2000" b="1" dirty="0" err="1"/>
+                  <a:t>énergies</a:t>
+                </a:r>
+                <a:r>
+                  <a:rPr lang="en-GB" sz="2000" b="1" dirty="0"/>
+                  <a:t> (</a:t>
+                </a:r>
+                <a:r>
+                  <a:rPr lang="en-GB" sz="2000" b="1" dirty="0" err="1"/>
+                  <a:t>cinétique</a:t>
+                </a:r>
+                <a:r>
+                  <a:rPr lang="en-GB" sz="2000" b="1" dirty="0"/>
+                  <a:t> et </a:t>
+                </a:r>
+                <a:r>
+                  <a:rPr lang="en-GB" sz="2000" b="1" dirty="0" err="1"/>
+                  <a:t>potentielle</a:t>
+                </a:r>
+                <a:r>
+                  <a:rPr lang="en-GB" sz="2000" b="1" dirty="0"/>
+                  <a:t>)</a:t>
+                </a:r>
+              </a:p>
+              <a:p>
+                <a:pPr>
+                  <a:buClr>
+                    <a:schemeClr val="accent2"/>
+                  </a:buClr>
+                  <a:buSzPct val="100000"/>
+                  <a:buFontTx/>
+                  <a:buChar char="-"/>
+                </a:pPr>
+                <a:r>
+                  <a:rPr lang="en-GB" sz="2000" b="1" dirty="0"/>
+                  <a:t>Utilise le </a:t>
+                </a:r>
+                <a:r>
+                  <a:rPr lang="en-GB" sz="2000" b="1" dirty="0" err="1"/>
+                  <a:t>principe</a:t>
+                </a:r>
+                <a:r>
+                  <a:rPr lang="en-GB" sz="2000" b="1" dirty="0"/>
+                  <a:t> de </a:t>
+                </a:r>
+                <a:r>
+                  <a:rPr lang="en-GB" sz="2000" b="1" dirty="0" err="1"/>
+                  <a:t>moindre</a:t>
+                </a:r>
+                <a:r>
+                  <a:rPr lang="en-GB" sz="2000" b="1" dirty="0"/>
+                  <a:t> action</a:t>
+                </a:r>
+                <a:endParaRPr lang="fr-CH" sz="3600" b="1" dirty="0"/>
+              </a:p>
+              <a:p>
+                <a:pPr marL="0" indent="0">
+                  <a:buClr>
+                    <a:schemeClr val="accent2"/>
+                  </a:buClr>
+                  <a:buSzPct val="100000"/>
+                  <a:buNone/>
+                </a:pPr>
+                <a:endParaRPr lang="fr-CH" sz="3600" b="1" dirty="0"/>
+              </a:p>
+              <a:p>
+                <a:pPr marL="0" indent="0" algn="ctr">
+                  <a:buClr>
+                    <a:schemeClr val="accent2"/>
+                  </a:buClr>
+                  <a:buSzPct val="100000"/>
+                  <a:buNone/>
+                </a:pPr>
+                <a14:m>
+                  <m:oMath xmlns:m="http://schemas.openxmlformats.org/officeDocument/2006/math">
+                    <m:f>
+                      <m:fPr>
+                        <m:ctrlPr>
+                          <a:rPr lang="fr-CH" sz="3600" b="1" dirty="0" smtClean="0">
+                            <a:latin typeface="Cambria Math" panose="02040503050406030204" pitchFamily="18" charset="0"/>
+                          </a:rPr>
+                        </m:ctrlPr>
+                      </m:fPr>
+                      <m:num>
+                        <m:r>
+                          <a:rPr lang="fr-CH" sz="3600" b="1" dirty="0">
+                            <a:latin typeface="Cambria Math" panose="02040503050406030204" pitchFamily="18" charset="0"/>
+                          </a:rPr>
+                          <m:t>ⅆ</m:t>
+                        </m:r>
+                      </m:num>
+                      <m:den>
+                        <m:r>
+                          <a:rPr lang="fr-CH" sz="3600" b="1" i="0" dirty="0">
+                            <a:latin typeface="Cambria Math" panose="02040503050406030204" pitchFamily="18" charset="0"/>
+                          </a:rPr>
+                          <m:t>ⅆ</m:t>
+                        </m:r>
+                        <m:r>
+                          <a:rPr lang="fr-CH" sz="3600" b="1" i="1" dirty="0">
+                            <a:latin typeface="Cambria Math" panose="02040503050406030204" pitchFamily="18" charset="0"/>
+                          </a:rPr>
+                          <m:t>𝑡</m:t>
+                        </m:r>
+                      </m:den>
+                    </m:f>
+                    <m:d>
+                      <m:dPr>
+                        <m:ctrlPr>
+                          <a:rPr lang="fr-CH" sz="3600" b="1" i="1" dirty="0">
+                            <a:latin typeface="Cambria Math" panose="02040503050406030204" pitchFamily="18" charset="0"/>
+                          </a:rPr>
+                        </m:ctrlPr>
+                      </m:dPr>
+                      <m:e>
+                        <m:f>
+                          <m:fPr>
+                            <m:ctrlPr>
+                              <a:rPr lang="fr-CH" sz="3600" b="1" i="1" dirty="0">
+                                <a:latin typeface="Cambria Math" panose="02040503050406030204" pitchFamily="18" charset="0"/>
+                              </a:rPr>
+                            </m:ctrlPr>
+                          </m:fPr>
+                          <m:num>
+                            <m:r>
+                              <a:rPr lang="fr-CH" sz="3600" b="1" i="1" dirty="0">
+                                <a:latin typeface="Cambria Math" panose="02040503050406030204" pitchFamily="18" charset="0"/>
+                              </a:rPr>
+                              <m:t>𝜃</m:t>
+                            </m:r>
+                            <m:r>
+                              <a:rPr lang="fr-CH" sz="3600" b="1" i="1" dirty="0">
+                                <a:latin typeface="Cambria Math" panose="02040503050406030204" pitchFamily="18" charset="0"/>
+                              </a:rPr>
+                              <m:t>𝐿</m:t>
+                            </m:r>
+                          </m:num>
+                          <m:den>
+                            <m:r>
+                              <a:rPr lang="fr-CH" sz="3600" b="1" i="1" dirty="0">
+                                <a:latin typeface="Cambria Math" panose="02040503050406030204" pitchFamily="18" charset="0"/>
+                              </a:rPr>
+                              <m:t>𝜃</m:t>
+                            </m:r>
+                            <m:sSub>
+                              <m:sSubPr>
+                                <m:ctrlPr>
+                                  <a:rPr lang="fr-CH" sz="3600" b="1" i="1" dirty="0">
+                                    <a:latin typeface="Cambria Math" panose="02040503050406030204" pitchFamily="18" charset="0"/>
+                                  </a:rPr>
+                                </m:ctrlPr>
+                              </m:sSubPr>
+                              <m:e>
+                                <m:acc>
+                                  <m:accPr>
+                                    <m:chr m:val="̇"/>
+                                    <m:ctrlPr>
+                                      <a:rPr lang="fr-CH" sz="3600" b="1" i="1" dirty="0">
+                                        <a:latin typeface="Cambria Math" panose="02040503050406030204" pitchFamily="18" charset="0"/>
+                                      </a:rPr>
+                                    </m:ctrlPr>
+                                  </m:accPr>
+                                  <m:e>
+                                    <m:r>
+                                      <a:rPr lang="fr-CH" sz="3600" b="1" i="1" dirty="0">
+                                        <a:latin typeface="Cambria Math" panose="02040503050406030204" pitchFamily="18" charset="0"/>
+                                      </a:rPr>
+                                      <m:t>𝑞</m:t>
+                                    </m:r>
+                                  </m:e>
+                                </m:acc>
+                              </m:e>
+                              <m:sub>
+                                <m:r>
+                                  <a:rPr lang="fr-CH" sz="3600" b="1" i="1" dirty="0">
+                                    <a:latin typeface="Cambria Math" panose="02040503050406030204" pitchFamily="18" charset="0"/>
+                                  </a:rPr>
+                                  <m:t>𝑖</m:t>
+                                </m:r>
+                              </m:sub>
+                            </m:sSub>
+                          </m:den>
+                        </m:f>
+                      </m:e>
+                    </m:d>
+                    <m:r>
+                      <a:rPr lang="fr-CH" sz="3600" b="1" i="0" dirty="0">
+                        <a:latin typeface="Cambria Math" panose="02040503050406030204" pitchFamily="18" charset="0"/>
+                      </a:rPr>
+                      <m:t>−</m:t>
+                    </m:r>
+                    <m:f>
+                      <m:fPr>
+                        <m:ctrlPr>
+                          <a:rPr lang="fr-CH" sz="3600" b="1" i="1" dirty="0">
+                            <a:latin typeface="Cambria Math" panose="02040503050406030204" pitchFamily="18" charset="0"/>
+                          </a:rPr>
+                        </m:ctrlPr>
+                      </m:fPr>
+                      <m:num>
+                        <m:r>
+                          <a:rPr lang="fr-CH" sz="3600" b="1" i="1" dirty="0">
+                            <a:latin typeface="Cambria Math" panose="02040503050406030204" pitchFamily="18" charset="0"/>
+                          </a:rPr>
+                          <m:t>𝜃</m:t>
+                        </m:r>
+                        <m:r>
+                          <a:rPr lang="fr-CH" sz="3600" b="1" i="1" dirty="0">
+                            <a:latin typeface="Cambria Math" panose="02040503050406030204" pitchFamily="18" charset="0"/>
+                          </a:rPr>
+                          <m:t>𝐿</m:t>
+                        </m:r>
+                      </m:num>
+                      <m:den>
+                        <m:r>
+                          <a:rPr lang="fr-CH" sz="3600" b="1" i="1" dirty="0">
+                            <a:latin typeface="Cambria Math" panose="02040503050406030204" pitchFamily="18" charset="0"/>
+                          </a:rPr>
+                          <m:t>𝜃</m:t>
+                        </m:r>
+                        <m:sSub>
+                          <m:sSubPr>
+                            <m:ctrlPr>
+                              <a:rPr lang="fr-CH" sz="3600" b="1" i="1" dirty="0">
+                                <a:latin typeface="Cambria Math" panose="02040503050406030204" pitchFamily="18" charset="0"/>
+                              </a:rPr>
+                            </m:ctrlPr>
+                          </m:sSubPr>
+                          <m:e>
+                            <m:r>
+                              <a:rPr lang="fr-CH" sz="3600" b="1" i="1" dirty="0">
+                                <a:latin typeface="Cambria Math" panose="02040503050406030204" pitchFamily="18" charset="0"/>
+                              </a:rPr>
+                              <m:t>𝑞</m:t>
+                            </m:r>
+                          </m:e>
+                          <m:sub>
+                            <m:r>
+                              <a:rPr lang="fr-CH" sz="3600" b="1" i="1" dirty="0">
+                                <a:latin typeface="Cambria Math" panose="02040503050406030204" pitchFamily="18" charset="0"/>
+                              </a:rPr>
+                              <m:t>𝑖</m:t>
+                            </m:r>
+                          </m:sub>
+                        </m:sSub>
+                      </m:den>
+                    </m:f>
+                    <m:r>
+                      <a:rPr lang="fr-CH" sz="3600" b="1" i="0" dirty="0">
+                        <a:latin typeface="Cambria Math" panose="02040503050406030204" pitchFamily="18" charset="0"/>
+                      </a:rPr>
+                      <m:t>=0</m:t>
+                    </m:r>
+                  </m:oMath>
+                </a14:m>
+                <a:r>
+                  <a:rPr lang="fr-CH" sz="3600" b="1" dirty="0"/>
+                  <a:t>    </a:t>
+                </a:r>
+                <a14:m>
+                  <m:oMath xmlns:m="http://schemas.openxmlformats.org/officeDocument/2006/math">
+                    <m:d>
+                      <m:dPr>
+                        <m:ctrlPr>
+                          <a:rPr lang="fr-CH" sz="3600" b="1" i="1" dirty="0" smtClean="0">
+                            <a:latin typeface="Cambria Math" panose="02040503050406030204" pitchFamily="18" charset="0"/>
+                          </a:rPr>
+                        </m:ctrlPr>
+                      </m:dPr>
+                      <m:e>
+                        <m:r>
+                          <a:rPr lang="fr-CH" sz="3600" b="1" i="1" dirty="0" smtClean="0">
+                            <a:latin typeface="Cambria Math" panose="02040503050406030204" pitchFamily="18" charset="0"/>
+                          </a:rPr>
+                          <m:t>ⅈ=1,2</m:t>
+                        </m:r>
+                      </m:e>
+                    </m:d>
+                  </m:oMath>
+                </a14:m>
+                <a:endParaRPr lang="fr-CH" sz="3600" b="1" dirty="0"/>
+              </a:p>
+              <a:p>
+                <a:pPr marL="0" indent="0">
+                  <a:buClr>
+                    <a:schemeClr val="accent2"/>
+                  </a:buClr>
+                  <a:buSzPct val="100000"/>
+                  <a:buNone/>
+                </a:pPr>
+                <a:endParaRPr lang="fr-CH" sz="1200" b="1" dirty="0"/>
+              </a:p>
+            </p:txBody>
+          </p:sp>
+        </mc:Choice>
+        <mc:Fallback>
+          <p:sp>
+            <p:nvSpPr>
+              <p:cNvPr id="3" name="Content Placeholder 2">
+                <a:extLst>
+                  <a:ext uri="{FF2B5EF4-FFF2-40B4-BE49-F238E27FC236}">
+                    <a16:creationId xmlns:a16="http://schemas.microsoft.com/office/drawing/2014/main" id="{7811A8F7-4C51-ACE8-141E-F08EC0C328C4}"/>
+                  </a:ext>
+                </a:extLst>
+              </p:cNvPr>
+              <p:cNvSpPr>
+                <a:spLocks noGrp="1" noRot="1" noChangeAspect="1" noMove="1" noResize="1" noEditPoints="1" noAdjustHandles="1" noChangeArrowheads="1" noChangeShapeType="1" noTextEdit="1"/>
+              </p:cNvSpPr>
+              <p:nvPr>
+                <p:ph sz="half" idx="1"/>
+              </p:nvPr>
+            </p:nvSpPr>
+            <p:spPr>
+              <a:xfrm>
+                <a:off x="497570" y="1393312"/>
+                <a:ext cx="11143046" cy="4916008"/>
+              </a:xfrm>
+              <a:blipFill>
+                <a:blip r:embed="rId3"/>
+                <a:stretch>
+                  <a:fillRect l="-766"/>
+                </a:stretch>
+              </a:blipFill>
+            </p:spPr>
+            <p:txBody>
+              <a:bodyPr/>
+              <a:lstStyle/>
+              <a:p>
+                <a:r>
+                  <a:rPr lang="fr-CH">
+                    <a:noFill/>
+                  </a:rPr>
+                  <a:t> </a:t>
+                </a:r>
+              </a:p>
+            </p:txBody>
+          </p:sp>
+        </mc:Fallback>
+      </mc:AlternateContent>
       <p:sp>
         <p:nvSpPr>
           <p:cNvPr id="7" name="Slide Number Placeholder 6">
             <a:extLst>
               <a:ext uri="{FF2B5EF4-FFF2-40B4-BE49-F238E27FC236}">
-                <a16:creationId xmlns:a16="http://schemas.microsoft.com/office/drawing/2014/main" id="{11E4A239-3C30-5128-01B0-6FA28FAE6CF6}"/>
+                <a16:creationId xmlns:a16="http://schemas.microsoft.com/office/drawing/2014/main" id="{3C1CDDA9-BD84-9B43-F960-CF0F9045AEE8}"/>
               </a:ext>
             </a:extLst>
           </p:cNvPr>
@@ -11879,7 +12211,7 @@
             <a:fld id="{23C040C7-4060-4381-887A-2EF827EF70EC}" type="slidenum">
               <a:rPr lang="fr-CH" smtClean="0"/>
               <a:pPr/>
-              <a:t>6</a:t>
+              <a:t>4</a:t>
             </a:fld>
             <a:endParaRPr lang="fr-CH"/>
           </a:p>
@@ -11890,7 +12222,7 @@
           <p:cNvPr id="4" name="Date Placeholder 3">
             <a:extLst>
               <a:ext uri="{FF2B5EF4-FFF2-40B4-BE49-F238E27FC236}">
-                <a16:creationId xmlns:a16="http://schemas.microsoft.com/office/drawing/2014/main" id="{4E2296CE-EED2-7816-8FAC-23F1DCC45922}"/>
+                <a16:creationId xmlns:a16="http://schemas.microsoft.com/office/drawing/2014/main" id="{2E11C17B-F318-1584-D8F8-3118A6F87E80}"/>
               </a:ext>
             </a:extLst>
           </p:cNvPr>
@@ -12119,7 +12451,7 @@
           <p:cNvPr id="5" name="Picture 4" descr="A black and white text&#10;&#10;AI-generated content may be incorrect.">
             <a:extLst>
               <a:ext uri="{FF2B5EF4-FFF2-40B4-BE49-F238E27FC236}">
-                <a16:creationId xmlns:a16="http://schemas.microsoft.com/office/drawing/2014/main" id="{2D69489D-D4EB-874B-BD7D-0DEA1939C84C}"/>
+                <a16:creationId xmlns:a16="http://schemas.microsoft.com/office/drawing/2014/main" id="{79D1F1D1-D008-5BC3-1D50-AFFCBC85518F}"/>
               </a:ext>
             </a:extLst>
           </p:cNvPr>
@@ -12129,7 +12461,7 @@
           <p:nvPr/>
         </p:nvPicPr>
         <p:blipFill>
-          <a:blip r:embed="rId3" cstate="print">
+          <a:blip r:embed="rId4" cstate="print">
             <a:extLst>
               <a:ext uri="{28A0092B-C50C-407E-A947-70E740481C1C}">
                 <a14:useLocalDpi xmlns:a14="http://schemas.microsoft.com/office/drawing/2010/main" val="0"/>
@@ -12153,7 +12485,7 @@
     </p:spTree>
     <p:extLst>
       <p:ext uri="{BB962C8B-B14F-4D97-AF65-F5344CB8AC3E}">
-        <p14:creationId xmlns:p14="http://schemas.microsoft.com/office/powerpoint/2010/main" val="2946429567"/>
+        <p14:creationId xmlns:p14="http://schemas.microsoft.com/office/powerpoint/2010/main" val="1628083198"/>
       </p:ext>
     </p:extLst>
   </p:cSld>
@@ -12168,10 +12500,89 @@
       <p:transition/>
     </mc:Fallback>
   </mc:AlternateContent>
+  <p:timing>
+    <p:tnLst>
+      <p:par>
+        <p:cTn id="1" dur="indefinite" restart="never" nodeType="tmRoot">
+          <p:childTnLst>
+            <p:seq concurrent="1" nextAc="seek">
+              <p:cTn id="2" dur="indefinite" nodeType="mainSeq">
+                <p:childTnLst>
+                  <p:par>
+                    <p:cTn id="3" fill="hold">
+                      <p:stCondLst>
+                        <p:cond delay="indefinite"/>
+                      </p:stCondLst>
+                      <p:childTnLst>
+                        <p:par>
+                          <p:cTn id="4" fill="hold">
+                            <p:stCondLst>
+                              <p:cond delay="0"/>
+                            </p:stCondLst>
+                            <p:childTnLst>
+                              <p:par>
+                                <p:cTn id="5" presetID="1" presetClass="entr" presetSubtype="0" fill="hold" nodeType="clickEffect">
+                                  <p:stCondLst>
+                                    <p:cond delay="0"/>
+                                  </p:stCondLst>
+                                  <p:childTnLst>
+                                    <p:set>
+                                      <p:cBhvr>
+                                        <p:cTn id="6" dur="1" fill="hold">
+                                          <p:stCondLst>
+                                            <p:cond delay="0"/>
+                                          </p:stCondLst>
+                                        </p:cTn>
+                                        <p:tgtEl>
+                                          <p:spTgt spid="3">
+                                            <p:txEl>
+                                              <p:pRg st="4" end="4"/>
+                                            </p:txEl>
+                                          </p:spTgt>
+                                        </p:tgtEl>
+                                        <p:attrNameLst>
+                                          <p:attrName>style.visibility</p:attrName>
+                                        </p:attrNameLst>
+                                      </p:cBhvr>
+                                      <p:to>
+                                        <p:strVal val="visible"/>
+                                      </p:to>
+                                    </p:set>
+                                  </p:childTnLst>
+                                </p:cTn>
+                              </p:par>
+                            </p:childTnLst>
+                          </p:cTn>
+                        </p:par>
+                      </p:childTnLst>
+                    </p:cTn>
+                  </p:par>
+                </p:childTnLst>
+              </p:cTn>
+              <p:prevCondLst>
+                <p:cond evt="onPrev" delay="0">
+                  <p:tgtEl>
+                    <p:sldTgt/>
+                  </p:tgtEl>
+                </p:cond>
+              </p:prevCondLst>
+              <p:nextCondLst>
+                <p:cond evt="onNext" delay="0">
+                  <p:tgtEl>
+                    <p:sldTgt/>
+                  </p:tgtEl>
+                </p:cond>
+              </p:nextCondLst>
+            </p:seq>
+          </p:childTnLst>
+        </p:cTn>
+      </p:par>
+    </p:tnLst>
+  </p:timing>
 </p:sld>
 </file>
 
-<file path=ppt/slides/slide7.xml><?xml version="1.0" encoding="utf-8"?>
+<file path=ppt/slides/slide5.xml><?xml version="1.0" encoding="utf-8"?>
 <p:sld xmlns:a="http://schemas.openxmlformats.org/drawingml/2006/main" xmlns:r="http://schemas.openxmlformats.org/officeDocument/2006/relationships" xmlns:p="http://schemas.openxmlformats.org/presentationml/2006/main">
   <p:cSld>
     <p:spTree>
@@ -12231,114 +12642,248 @@
           </a:p>
         </p:txBody>
       </p:sp>
-      <p:sp>
-        <p:nvSpPr>
-          <p:cNvPr id="3" name="Content Placeholder 2">
-            <a:extLst>
-              <a:ext uri="{FF2B5EF4-FFF2-40B4-BE49-F238E27FC236}">
-                <a16:creationId xmlns:a16="http://schemas.microsoft.com/office/drawing/2014/main" id="{148A6D9F-0D04-4C9E-CC58-704FC06105E4}"/>
-              </a:ext>
-            </a:extLst>
-          </p:cNvPr>
-          <p:cNvSpPr>
-            <a:spLocks noGrp="1"/>
-          </p:cNvSpPr>
-          <p:nvPr>
-            <p:ph sz="half" idx="1"/>
-          </p:nvPr>
-        </p:nvSpPr>
-        <p:spPr>
-          <a:xfrm>
-            <a:off x="497570" y="1393312"/>
-            <a:ext cx="11143046" cy="4916008"/>
-          </a:xfrm>
-        </p:spPr>
-        <p:txBody>
-          <a:bodyPr>
-            <a:normAutofit/>
-          </a:bodyPr>
-          <a:lstStyle/>
-          <a:p>
-            <a:pPr>
-              <a:buClr>
-                <a:schemeClr val="accent2"/>
-              </a:buClr>
-              <a:buSzPct val="100000"/>
-              <a:buFontTx/>
-              <a:buChar char="-"/>
-            </a:pPr>
-            <a:r>
-              <a:rPr lang="fr-CH" sz="1600" b="1" dirty="0"/>
-              <a:t>Pendule double = non conservateur</a:t>
-            </a:r>
-          </a:p>
-          <a:p>
-            <a:pPr>
-              <a:buClr>
-                <a:schemeClr val="accent2"/>
-              </a:buClr>
-              <a:buSzPct val="100000"/>
-              <a:buFontTx/>
-              <a:buChar char="-"/>
-            </a:pPr>
-            <a:r>
-              <a:rPr lang="en-GB" sz="1600" b="1" dirty="0"/>
-              <a:t>⚠️ Pour 2 seconds = </a:t>
-            </a:r>
-            <a:r>
-              <a:rPr lang="en-GB" sz="1600" b="1" dirty="0" err="1"/>
-              <a:t>perte</a:t>
-            </a:r>
-            <a:r>
-              <a:rPr lang="en-GB" sz="1600" b="1" dirty="0"/>
-              <a:t> </a:t>
-            </a:r>
-            <a:r>
-              <a:rPr lang="en-GB" sz="1600" b="1" dirty="0" err="1"/>
-              <a:t>d’énergies</a:t>
-            </a:r>
-            <a:r>
-              <a:rPr lang="en-GB" sz="1600" b="1" dirty="0"/>
-              <a:t> </a:t>
-            </a:r>
-            <a:r>
-              <a:rPr lang="en-GB" sz="1600" b="1" dirty="0" err="1"/>
-              <a:t>faible</a:t>
-            </a:r>
-            <a:r>
-              <a:rPr lang="en-GB" sz="1600" b="1" dirty="0"/>
-              <a:t> = ~</a:t>
-            </a:r>
-            <a:r>
-              <a:rPr lang="en-GB" sz="1600" b="1"/>
-              <a:t>conservateur</a:t>
-            </a:r>
-            <a:endParaRPr lang="fr-CH" sz="1600" b="1" dirty="0"/>
-          </a:p>
-          <a:p>
-            <a:pPr>
-              <a:buClr>
-                <a:schemeClr val="accent2"/>
-              </a:buClr>
-              <a:buSzPct val="100000"/>
-              <a:buFontTx/>
-              <a:buChar char="-"/>
-            </a:pPr>
-            <a:endParaRPr lang="fr-CH" sz="1200" b="1" dirty="0"/>
-          </a:p>
-          <a:p>
-            <a:pPr lvl="1">
-              <a:buClr>
-                <a:schemeClr val="accent2"/>
-              </a:buClr>
-              <a:buSzPct val="100000"/>
-              <a:buFontTx/>
-              <a:buChar char="-"/>
-            </a:pPr>
-            <a:endParaRPr lang="fr-CH" sz="1200" b="1" dirty="0"/>
-          </a:p>
-        </p:txBody>
-      </p:sp>
+      <mc:AlternateContent xmlns:mc="http://schemas.openxmlformats.org/markup-compatibility/2006">
+        <mc:Choice xmlns:a14="http://schemas.microsoft.com/office/drawing/2010/main" Requires="a14">
+          <p:sp>
+            <p:nvSpPr>
+              <p:cNvPr id="3" name="Content Placeholder 2">
+                <a:extLst>
+                  <a:ext uri="{FF2B5EF4-FFF2-40B4-BE49-F238E27FC236}">
+                    <a16:creationId xmlns:a16="http://schemas.microsoft.com/office/drawing/2014/main" id="{148A6D9F-0D04-4C9E-CC58-704FC06105E4}"/>
+                  </a:ext>
+                </a:extLst>
+              </p:cNvPr>
+              <p:cNvSpPr>
+                <a:spLocks noGrp="1"/>
+              </p:cNvSpPr>
+              <p:nvPr>
+                <p:ph sz="half" idx="1"/>
+              </p:nvPr>
+            </p:nvSpPr>
+            <p:spPr>
+              <a:xfrm>
+                <a:off x="497570" y="1393312"/>
+                <a:ext cx="11143046" cy="4916008"/>
+              </a:xfrm>
+            </p:spPr>
+            <p:txBody>
+              <a:bodyPr>
+                <a:normAutofit/>
+              </a:bodyPr>
+              <a:lstStyle/>
+              <a:p>
+                <a:pPr>
+                  <a:buClr>
+                    <a:schemeClr val="accent2"/>
+                  </a:buClr>
+                  <a:buSzPct val="100000"/>
+                  <a:buFontTx/>
+                  <a:buChar char="-"/>
+                </a:pPr>
+                <a:r>
+                  <a:rPr lang="fr-CH" sz="2000" b="1" dirty="0"/>
+                  <a:t>Le pendule double est idéalement conservateur</a:t>
+                </a:r>
+              </a:p>
+              <a:p>
+                <a:pPr>
+                  <a:buClr>
+                    <a:schemeClr val="accent2"/>
+                  </a:buClr>
+                  <a:buSzPct val="100000"/>
+                  <a:buFontTx/>
+                  <a:buChar char="-"/>
+                </a:pPr>
+                <a:r>
+                  <a:rPr lang="en-GB" sz="2000" b="1" dirty="0"/>
+                  <a:t>⚠️ </a:t>
+                </a:r>
+                <a:r>
+                  <a:rPr lang="en-GB" sz="2000" b="1" dirty="0" err="1"/>
+                  <a:t>en</a:t>
+                </a:r>
+                <a:r>
+                  <a:rPr lang="en-GB" sz="2000" b="1" dirty="0"/>
+                  <a:t> </a:t>
+                </a:r>
+                <a:r>
+                  <a:rPr lang="en-GB" sz="2000" b="1" dirty="0" err="1"/>
+                  <a:t>réalité</a:t>
+                </a:r>
+                <a:r>
+                  <a:rPr lang="en-GB" sz="2000" b="1" dirty="0"/>
+                  <a:t>, des </a:t>
+                </a:r>
+                <a:r>
+                  <a:rPr lang="en-GB" sz="2000" b="1" dirty="0" err="1"/>
+                  <a:t>pertes</a:t>
+                </a:r>
+                <a:r>
+                  <a:rPr lang="en-GB" sz="2000" b="1" dirty="0"/>
+                  <a:t> </a:t>
+                </a:r>
+                <a:r>
+                  <a:rPr lang="en-GB" sz="2000" b="1" dirty="0" err="1"/>
+                  <a:t>peuvent</a:t>
+                </a:r>
+                <a:r>
+                  <a:rPr lang="en-GB" sz="2000" b="1" dirty="0"/>
+                  <a:t> </a:t>
+                </a:r>
+                <a:r>
+                  <a:rPr lang="en-GB" sz="2000" b="1" dirty="0" err="1"/>
+                  <a:t>apparaître</a:t>
+                </a:r>
+                <a:r>
+                  <a:rPr lang="en-GB" sz="2000" b="1" dirty="0"/>
+                  <a:t> (</a:t>
+                </a:r>
+                <a:r>
+                  <a:rPr lang="en-GB" sz="2000" b="1" dirty="0" err="1"/>
+                  <a:t>frottement</a:t>
+                </a:r>
+                <a:r>
+                  <a:rPr lang="en-GB" sz="2000" b="1" dirty="0"/>
+                  <a:t>, …)</a:t>
+                </a:r>
+              </a:p>
+              <a:p>
+                <a:pPr>
+                  <a:buClr>
+                    <a:schemeClr val="accent2"/>
+                  </a:buClr>
+                  <a:buSzPct val="100000"/>
+                  <a:buFontTx/>
+                  <a:buChar char="-"/>
+                </a:pPr>
+                <a:r>
+                  <a:rPr lang="fr-FR" sz="2000" b="1" dirty="0"/>
+                  <a:t>Malgré la conservation de l’énergie, le mouvement du double pendule peut devenir chaotique à cause de la non-linéarité des équations du mouvement.</a:t>
+                </a:r>
+                <a:endParaRPr lang="fr-CH" sz="2000" b="1" dirty="0"/>
+              </a:p>
+              <a:p>
+                <a:pPr>
+                  <a:buClr>
+                    <a:schemeClr val="accent2"/>
+                  </a:buClr>
+                  <a:buSzPct val="100000"/>
+                  <a:buFontTx/>
+                  <a:buChar char="-"/>
+                </a:pPr>
+                <a:endParaRPr lang="fr-CH" sz="2000" b="1" dirty="0"/>
+              </a:p>
+              <a:p>
+                <a:pPr marL="0" indent="0">
+                  <a:buClr>
+                    <a:schemeClr val="accent2"/>
+                  </a:buClr>
+                  <a:buSzPct val="100000"/>
+                  <a:buNone/>
+                </a:pPr>
+                <a14:m>
+                  <m:oMathPara xmlns:m="http://schemas.openxmlformats.org/officeDocument/2006/math">
+                    <m:oMathParaPr>
+                      <m:jc m:val="centerGroup"/>
+                    </m:oMathParaPr>
+                    <m:oMath xmlns:m="http://schemas.openxmlformats.org/officeDocument/2006/math">
+                      <m:r>
+                        <a:rPr lang="fr-CH" sz="3600" b="1" i="1" dirty="0" smtClean="0">
+                          <a:latin typeface="Cambria Math" panose="02040503050406030204" pitchFamily="18" charset="0"/>
+                        </a:rPr>
+                        <m:t>𝐸</m:t>
+                      </m:r>
+                      <m:r>
+                        <a:rPr lang="fr-CH" sz="3600" b="1" i="0" dirty="0" smtClean="0">
+                          <a:latin typeface="Cambria Math" panose="02040503050406030204" pitchFamily="18" charset="0"/>
+                        </a:rPr>
+                        <m:t>=</m:t>
+                      </m:r>
+                      <m:r>
+                        <a:rPr lang="fr-CH" sz="3600" b="1" i="1" dirty="0" smtClean="0">
+                          <a:latin typeface="Cambria Math" panose="02040503050406030204" pitchFamily="18" charset="0"/>
+                        </a:rPr>
+                        <m:t>𝑇</m:t>
+                      </m:r>
+                      <m:r>
+                        <a:rPr lang="fr-CH" sz="3600" b="1" i="0" dirty="0" smtClean="0">
+                          <a:latin typeface="Cambria Math" panose="02040503050406030204" pitchFamily="18" charset="0"/>
+                        </a:rPr>
+                        <m:t>+</m:t>
+                      </m:r>
+                      <m:r>
+                        <m:rPr>
+                          <m:sty m:val="p"/>
+                        </m:rPr>
+                        <a:rPr lang="en-GB" sz="3600" b="1" i="0" dirty="0" smtClean="0">
+                          <a:latin typeface="Cambria Math" panose="02040503050406030204" pitchFamily="18" charset="0"/>
+                        </a:rPr>
+                        <m:t>V</m:t>
+                      </m:r>
+                      <m:r>
+                        <a:rPr lang="fr-CH" sz="3600" b="1" i="0" dirty="0" smtClean="0">
+                          <a:latin typeface="Cambria Math" panose="02040503050406030204" pitchFamily="18" charset="0"/>
+                        </a:rPr>
+                        <m:t>=</m:t>
+                      </m:r>
+                      <m:r>
+                        <a:rPr lang="fr-CH" sz="3600" b="1" i="1" dirty="0" smtClean="0">
+                          <a:latin typeface="Cambria Math" panose="02040503050406030204" pitchFamily="18" charset="0"/>
+                        </a:rPr>
+                        <m:t>𝐻</m:t>
+                      </m:r>
+                    </m:oMath>
+                  </m:oMathPara>
+                </a14:m>
+                <a:endParaRPr lang="fr-CH" sz="3600" b="1" dirty="0"/>
+              </a:p>
+            </p:txBody>
+          </p:sp>
+        </mc:Choice>
+        <mc:Fallback>
+          <p:sp>
+            <p:nvSpPr>
+              <p:cNvPr id="3" name="Content Placeholder 2">
+                <a:extLst>
+                  <a:ext uri="{FF2B5EF4-FFF2-40B4-BE49-F238E27FC236}">
+                    <a16:creationId xmlns:a16="http://schemas.microsoft.com/office/drawing/2014/main" id="{148A6D9F-0D04-4C9E-CC58-704FC06105E4}"/>
+                  </a:ext>
+                </a:extLst>
+              </p:cNvPr>
+              <p:cNvSpPr>
+                <a:spLocks noGrp="1" noRot="1" noChangeAspect="1" noMove="1" noResize="1" noEditPoints="1" noAdjustHandles="1" noChangeArrowheads="1" noChangeShapeType="1" noTextEdit="1"/>
+              </p:cNvSpPr>
+              <p:nvPr>
+                <p:ph sz="half" idx="1"/>
+              </p:nvPr>
+            </p:nvSpPr>
+            <p:spPr>
+              <a:xfrm>
+                <a:off x="497570" y="1393312"/>
+                <a:ext cx="11143046" cy="4916008"/>
+              </a:xfrm>
+              <a:blipFill>
+                <a:blip r:embed="rId3"/>
+                <a:stretch>
+                  <a:fillRect l="-766" r="-438"/>
+                </a:stretch>
+              </a:blipFill>
+            </p:spPr>
+            <p:txBody>
+              <a:bodyPr/>
+              <a:lstStyle/>
+              <a:p>
+                <a:r>
+                  <a:rPr lang="fr-CH">
+                    <a:noFill/>
+                  </a:rPr>
+                  <a:t> </a:t>
+                </a:r>
+              </a:p>
+            </p:txBody>
+          </p:sp>
+        </mc:Fallback>
+      </mc:AlternateContent>
       <p:sp>
         <p:nvSpPr>
           <p:cNvPr id="7" name="Slide Number Placeholder 6">
@@ -12363,7 +12908,7 @@
             <a:fld id="{23C040C7-4060-4381-887A-2EF827EF70EC}" type="slidenum">
               <a:rPr lang="fr-CH" smtClean="0"/>
               <a:pPr/>
-              <a:t>7</a:t>
+              <a:t>5</a:t>
             </a:fld>
             <a:endParaRPr lang="fr-CH"/>
           </a:p>
@@ -12613,7 +13158,7 @@
           <p:nvPr/>
         </p:nvPicPr>
         <p:blipFill>
-          <a:blip r:embed="rId3" cstate="print">
+          <a:blip r:embed="rId4" cstate="print">
             <a:extLst>
               <a:ext uri="{28A0092B-C50C-407E-A947-70E740481C1C}">
                 <a14:useLocalDpi xmlns:a14="http://schemas.microsoft.com/office/drawing/2010/main" val="0"/>
@@ -12644,18 +13189,97 @@
   <p:clrMapOvr>
     <a:masterClrMapping/>
   </p:clrMapOvr>
-  <mc:AlternateContent xmlns:mc="http://schemas.openxmlformats.org/markup-compatibility/2006">
-    <mc:Choice xmlns:p14="http://schemas.microsoft.com/office/powerpoint/2010/main" Requires="p14">
+  <mc:AlternateContent xmlns:mc="http://schemas.openxmlformats.org/markup-compatibility/2006" xmlns:p14="http://schemas.microsoft.com/office/powerpoint/2010/main">
+    <mc:Choice Requires="p14">
       <p:transition p14:dur="0"/>
     </mc:Choice>
-    <mc:Fallback>
+    <mc:Fallback xmlns="">
       <p:transition/>
     </mc:Fallback>
   </mc:AlternateContent>
+  <p:timing>
+    <p:tnLst>
+      <p:par>
+        <p:cTn id="1" dur="indefinite" restart="never" nodeType="tmRoot">
+          <p:childTnLst>
+            <p:seq concurrent="1" nextAc="seek">
+              <p:cTn id="2" dur="indefinite" nodeType="mainSeq">
+                <p:childTnLst>
+                  <p:par>
+                    <p:cTn id="3" fill="hold">
+                      <p:stCondLst>
+                        <p:cond delay="indefinite"/>
+                      </p:stCondLst>
+                      <p:childTnLst>
+                        <p:par>
+                          <p:cTn id="4" fill="hold">
+                            <p:stCondLst>
+                              <p:cond delay="0"/>
+                            </p:stCondLst>
+                            <p:childTnLst>
+                              <p:par>
+                                <p:cTn id="5" presetID="1" presetClass="entr" presetSubtype="0" fill="hold" nodeType="clickEffect">
+                                  <p:stCondLst>
+                                    <p:cond delay="0"/>
+                                  </p:stCondLst>
+                                  <p:childTnLst>
+                                    <p:set>
+                                      <p:cBhvr>
+                                        <p:cTn id="6" dur="1" fill="hold">
+                                          <p:stCondLst>
+                                            <p:cond delay="0"/>
+                                          </p:stCondLst>
+                                        </p:cTn>
+                                        <p:tgtEl>
+                                          <p:spTgt spid="3">
+                                            <p:txEl>
+                                              <p:pRg st="4" end="4"/>
+                                            </p:txEl>
+                                          </p:spTgt>
+                                        </p:tgtEl>
+                                        <p:attrNameLst>
+                                          <p:attrName>style.visibility</p:attrName>
+                                        </p:attrNameLst>
+                                      </p:cBhvr>
+                                      <p:to>
+                                        <p:strVal val="visible"/>
+                                      </p:to>
+                                    </p:set>
+                                  </p:childTnLst>
+                                </p:cTn>
+                              </p:par>
+                            </p:childTnLst>
+                          </p:cTn>
+                        </p:par>
+                      </p:childTnLst>
+                    </p:cTn>
+                  </p:par>
+                </p:childTnLst>
+              </p:cTn>
+              <p:prevCondLst>
+                <p:cond evt="onPrev" delay="0">
+                  <p:tgtEl>
+                    <p:sldTgt/>
+                  </p:tgtEl>
+                </p:cond>
+              </p:prevCondLst>
+              <p:nextCondLst>
+                <p:cond evt="onNext" delay="0">
+                  <p:tgtEl>
+                    <p:sldTgt/>
+                  </p:tgtEl>
+                </p:cond>
+              </p:nextCondLst>
+            </p:seq>
+          </p:childTnLst>
+        </p:cTn>
+      </p:par>
+    </p:tnLst>
+  </p:timing>
 </p:sld>
 </file>
 
-<file path=ppt/slides/slide8.xml><?xml version="1.0" encoding="utf-8"?>
+<file path=ppt/slides/slide6.xml><?xml version="1.0" encoding="utf-8"?>
 <p:sld xmlns:a="http://schemas.openxmlformats.org/drawingml/2006/main" xmlns:r="http://schemas.openxmlformats.org/officeDocument/2006/relationships" xmlns:p="http://schemas.openxmlformats.org/presentationml/2006/main">
   <p:cSld>
     <p:spTree>
@@ -12678,47 +13302,6 @@
           <a:chExt cx="0" cy="0"/>
         </a:xfrm>
       </p:grpSpPr>
-      <p:sp>
-        <p:nvSpPr>
-          <p:cNvPr id="2" name="Title 1">
-            <a:extLst>
-              <a:ext uri="{FF2B5EF4-FFF2-40B4-BE49-F238E27FC236}">
-                <a16:creationId xmlns:a16="http://schemas.microsoft.com/office/drawing/2014/main" id="{560F2575-ECA6-5E65-AF56-2C447369250D}"/>
-              </a:ext>
-            </a:extLst>
-          </p:cNvPr>
-          <p:cNvSpPr>
-            <a:spLocks noGrp="1"/>
-          </p:cNvSpPr>
-          <p:nvPr>
-            <p:ph type="title"/>
-          </p:nvPr>
-        </p:nvSpPr>
-        <p:spPr/>
-        <p:txBody>
-          <a:bodyPr/>
-          <a:lstStyle/>
-          <a:p>
-            <a:r>
-              <a:rPr lang="fr-CH" dirty="0"/>
-              <a:t>Plan de projet </a:t>
-            </a:r>
-            <a:r>
-              <a:rPr lang="fr-CH" dirty="0">
-                <a:solidFill>
-                  <a:srgbClr val="FF0000"/>
-                </a:solidFill>
-              </a:rPr>
-              <a:t>(2 minutes)</a:t>
-            </a:r>
-            <a:endParaRPr lang="en-US" dirty="0">
-              <a:solidFill>
-                <a:srgbClr val="FF0000"/>
-              </a:solidFill>
-            </a:endParaRPr>
-          </a:p>
-        </p:txBody>
-      </p:sp>
       <p:pic>
         <p:nvPicPr>
           <p:cNvPr id="6" name="Content Placeholder 5">
@@ -12778,7 +13361,7 @@
             <a:fld id="{23C040C7-4060-4381-887A-2EF827EF70EC}" type="slidenum">
               <a:rPr lang="fr-CH" smtClean="0"/>
               <a:pPr/>
-              <a:t>8</a:t>
+              <a:t>6</a:t>
             </a:fld>
             <a:endParaRPr lang="fr-CH"/>
           </a:p>
@@ -13049,6 +13632,31 @@
           </a:prstGeom>
         </p:spPr>
       </p:pic>
+      <p:sp>
+        <p:nvSpPr>
+          <p:cNvPr id="5" name="Title 4">
+            <a:extLst>
+              <a:ext uri="{FF2B5EF4-FFF2-40B4-BE49-F238E27FC236}">
+                <a16:creationId xmlns:a16="http://schemas.microsoft.com/office/drawing/2014/main" id="{36F87A59-E034-DC72-F553-117584A83F49}"/>
+              </a:ext>
+            </a:extLst>
+          </p:cNvPr>
+          <p:cNvSpPr>
+            <a:spLocks noGrp="1"/>
+          </p:cNvSpPr>
+          <p:nvPr>
+            <p:ph type="title"/>
+          </p:nvPr>
+        </p:nvSpPr>
+        <p:spPr/>
+        <p:txBody>
+          <a:bodyPr/>
+          <a:lstStyle/>
+          <a:p>
+            <a:endParaRPr lang="fr-CH"/>
+          </a:p>
+        </p:txBody>
+      </p:sp>
     </p:spTree>
     <p:extLst>
       <p:ext uri="{BB962C8B-B14F-4D97-AF65-F5344CB8AC3E}">
@@ -13990,26 +14598,6 @@
 </file>
 
 <file path=customXml/item1.xml><?xml version="1.0" encoding="utf-8"?>
-<?mso-contentType ?>
-<FormTemplates xmlns="http://schemas.microsoft.com/sharepoint/v3/contenttype/forms">
-  <Display>DocumentLibraryForm</Display>
-  <Edit>DocumentLibraryForm</Edit>
-  <New>DocumentLibraryForm</New>
-</FormTemplates>
-</file>
-
-<file path=customXml/item2.xml><?xml version="1.0" encoding="utf-8"?>
-<p:properties xmlns:p="http://schemas.microsoft.com/office/2006/metadata/properties" xmlns:xsi="http://www.w3.org/2001/XMLSchema-instance" xmlns:pc="http://schemas.microsoft.com/office/infopath/2007/PartnerControls">
-  <documentManagement>
-    <lcf76f155ced4ddcb4097134ff3c332f xmlns="867800f0-a197-48df-b3d8-63ad447b0afe">
-      <Terms xmlns="http://schemas.microsoft.com/office/infopath/2007/PartnerControls"/>
-    </lcf76f155ced4ddcb4097134ff3c332f>
-    <TaxCatchAll xmlns="e7634316-75c5-4675-ae1f-8517fcbfe30d" xsi:nil="true"/>
-  </documentManagement>
-</p:properties>
-</file>
-
-<file path=customXml/item3.xml><?xml version="1.0" encoding="utf-8"?>
 <ct:contentTypeSchema xmlns:ct="http://schemas.microsoft.com/office/2006/metadata/contentType" xmlns:ma="http://schemas.microsoft.com/office/2006/metadata/properties/metaAttributes" ct:_="" ma:_="" ma:contentTypeName="Document" ma:contentTypeID="0x0101007BAE827F9E369F47BA44DF5D5B04C2CA" ma:contentTypeVersion="11" ma:contentTypeDescription="Crée un document." ma:contentTypeScope="" ma:versionID="b7d19f48c3bb3549c387cdf7aa4712b4">
   <xsd:schema xmlns:xsd="http://www.w3.org/2001/XMLSchema" xmlns:xs="http://www.w3.org/2001/XMLSchema" xmlns:p="http://schemas.microsoft.com/office/2006/metadata/properties" xmlns:ns2="e7634316-75c5-4675-ae1f-8517fcbfe30d" xmlns:ns3="867800f0-a197-48df-b3d8-63ad447b0afe" targetNamespace="http://schemas.microsoft.com/office/2006/metadata/properties" ma:root="true" ma:fieldsID="5a40304e7c366f484882961a3762423f" ns2:_="" ns3:_="">
     <xsd:import namespace="e7634316-75c5-4675-ae1f-8517fcbfe30d"/>
@@ -14220,32 +14808,27 @@
 </ct:contentTypeSchema>
 </file>
 
-<file path=customXml/itemProps1.xml><?xml version="1.0" encoding="utf-8"?>
-<ds:datastoreItem xmlns:ds="http://schemas.openxmlformats.org/officeDocument/2006/customXml" ds:itemID="{D96CA7C3-5467-41A0-A6A5-CAC955E7D149}">
-  <ds:schemaRefs>
-    <ds:schemaRef ds:uri="http://schemas.microsoft.com/sharepoint/v3/contenttype/forms"/>
-  </ds:schemaRefs>
-</ds:datastoreItem>
+<file path=customXml/item2.xml><?xml version="1.0" encoding="utf-8"?>
+<p:properties xmlns:p="http://schemas.microsoft.com/office/2006/metadata/properties" xmlns:xsi="http://www.w3.org/2001/XMLSchema-instance" xmlns:pc="http://schemas.microsoft.com/office/infopath/2007/PartnerControls">
+  <documentManagement>
+    <lcf76f155ced4ddcb4097134ff3c332f xmlns="867800f0-a197-48df-b3d8-63ad447b0afe">
+      <Terms xmlns="http://schemas.microsoft.com/office/infopath/2007/PartnerControls"/>
+    </lcf76f155ced4ddcb4097134ff3c332f>
+    <TaxCatchAll xmlns="e7634316-75c5-4675-ae1f-8517fcbfe30d" xsi:nil="true"/>
+  </documentManagement>
+</p:properties>
 </file>
 
-<file path=customXml/itemProps2.xml><?xml version="1.0" encoding="utf-8"?>
-<ds:datastoreItem xmlns:ds="http://schemas.openxmlformats.org/officeDocument/2006/customXml" ds:itemID="{F759E773-22B4-4E72-98E9-9A972373B22D}">
-  <ds:schemaRefs>
-    <ds:schemaRef ds:uri="http://schemas.microsoft.com/office/infopath/2007/PartnerControls"/>
-    <ds:schemaRef ds:uri="http://purl.org/dc/elements/1.1/"/>
-    <ds:schemaRef ds:uri="http://schemas.microsoft.com/office/2006/documentManagement/types"/>
-    <ds:schemaRef ds:uri="867800f0-a197-48df-b3d8-63ad447b0afe"/>
-    <ds:schemaRef ds:uri="http://purl.org/dc/terms/"/>
-    <ds:schemaRef ds:uri="http://schemas.openxmlformats.org/package/2006/metadata/core-properties"/>
-    <ds:schemaRef ds:uri="http://purl.org/dc/dcmitype/"/>
-    <ds:schemaRef ds:uri="e7634316-75c5-4675-ae1f-8517fcbfe30d"/>
-    <ds:schemaRef ds:uri="http://schemas.microsoft.com/office/2006/metadata/properties"/>
-    <ds:schemaRef ds:uri="http://www.w3.org/XML/1998/namespace"/>
-  </ds:schemaRefs>
-</ds:datastoreItem>
+<file path=customXml/item3.xml><?xml version="1.0" encoding="utf-8"?>
+<?mso-contentType ?>
+<FormTemplates xmlns="http://schemas.microsoft.com/sharepoint/v3/contenttype/forms">
+  <Display>DocumentLibraryForm</Display>
+  <Edit>DocumentLibraryForm</Edit>
+  <New>DocumentLibraryForm</New>
+</FormTemplates>
 </file>
 
-<file path=customXml/itemProps3.xml><?xml version="1.0" encoding="utf-8"?>
+<file path=customXml/itemProps1.xml><?xml version="1.0" encoding="utf-8"?>
 <ds:datastoreItem xmlns:ds="http://schemas.openxmlformats.org/officeDocument/2006/customXml" ds:itemID="{D84B9BDF-6BDA-4CDE-91C7-275064FCDB0A}">
   <ds:schemaRefs>
     <ds:schemaRef ds:uri="http://schemas.microsoft.com/office/2006/metadata/contentType"/>
@@ -14262,4 +14845,29 @@
     <ds:schemaRef ds:uri="http://schemas.microsoft.com/internal/obd"/>
   </ds:schemaRefs>
 </ds:datastoreItem>
+</file>
+
+<file path=customXml/itemProps2.xml><?xml version="1.0" encoding="utf-8"?>
+<ds:datastoreItem xmlns:ds="http://schemas.openxmlformats.org/officeDocument/2006/customXml" ds:itemID="{F759E773-22B4-4E72-98E9-9A972373B22D}">
+  <ds:schemaRefs>
+    <ds:schemaRef ds:uri="http://schemas.microsoft.com/office/2006/metadata/properties"/>
+    <ds:schemaRef ds:uri="http://schemas.microsoft.com/office/infopath/2007/PartnerControls"/>
+    <ds:schemaRef ds:uri="e7634316-75c5-4675-ae1f-8517fcbfe30d"/>
+    <ds:schemaRef ds:uri="http://purl.org/dc/elements/1.1/"/>
+    <ds:schemaRef ds:uri="http://purl.org/dc/dcmitype/"/>
+    <ds:schemaRef ds:uri="http://schemas.microsoft.com/office/2006/documentManagement/types"/>
+    <ds:schemaRef ds:uri="http://purl.org/dc/terms/"/>
+    <ds:schemaRef ds:uri="http://schemas.openxmlformats.org/package/2006/metadata/core-properties"/>
+    <ds:schemaRef ds:uri="867800f0-a197-48df-b3d8-63ad447b0afe"/>
+    <ds:schemaRef ds:uri="http://www.w3.org/XML/1998/namespace"/>
+  </ds:schemaRefs>
+</ds:datastoreItem>
+</file>
+
+<file path=customXml/itemProps3.xml><?xml version="1.0" encoding="utf-8"?>
+<ds:datastoreItem xmlns:ds="http://schemas.openxmlformats.org/officeDocument/2006/customXml" ds:itemID="{D96CA7C3-5467-41A0-A6A5-CAC955E7D149}">
+  <ds:schemaRefs>
+    <ds:schemaRef ds:uri="http://schemas.microsoft.com/sharepoint/v3/contenttype/forms"/>
+  </ds:schemaRefs>
+</ds:datastoreItem>
 </file>
</xml_diff>